<commit_message>
added to lm demonstration
</commit_message>
<xml_diff>
--- a/presentation/pptx/01-Linear_regression_methods.pptx
+++ b/presentation/pptx/01-Linear_regression_methods.pptx
@@ -5,7 +5,7 @@
     <p:sldMasterId id="2147483840" r:id="rId1"/>
   </p:sldMasterIdLst>
   <p:notesMasterIdLst>
-    <p:notesMasterId r:id="rId24"/>
+    <p:notesMasterId r:id="rId25"/>
   </p:notesMasterIdLst>
   <p:sldIdLst>
     <p:sldId id="256" r:id="rId2"/>
@@ -30,6 +30,7 @@
     <p:sldId id="270" r:id="rId21"/>
     <p:sldId id="281" r:id="rId22"/>
     <p:sldId id="261" r:id="rId23"/>
+    <p:sldId id="282" r:id="rId24"/>
   </p:sldIdLst>
   <p:sldSz cx="12192000" cy="6858000"/>
   <p:notesSz cx="6858000" cy="9144000"/>
@@ -234,7 +235,7 @@
           <a:p>
             <a:fld id="{5C93CA8F-50F8-44B5-B48F-4C4452AC4FCB}" type="datetimeFigureOut">
               <a:rPr lang="he-IL" smtClean="0"/>
-              <a:t>י"ב/תמוז/תשע"ט</a:t>
+              <a:t>י"ג/תמוז/תשע"ט</a:t>
             </a:fld>
             <a:endParaRPr lang="he-IL"/>
           </a:p>
@@ -7872,6 +7873,12 @@
           <a:p>
             <a:r>
               <a:rPr lang="en-US" dirty="0"/>
+              <a:t>Hypothesis testing</a:t>
+            </a:r>
+          </a:p>
+          <a:p>
+            <a:r>
+              <a:rPr lang="en-US" dirty="0"/>
               <a:t>Using </a:t>
             </a:r>
             <a:r>
@@ -7886,19 +7893,13 @@
           <a:p>
             <a:r>
               <a:rPr lang="en-US" dirty="0"/>
-              <a:t>Variable selection with </a:t>
+              <a:t>Feature selection with </a:t>
             </a:r>
             <a:r>
               <a:rPr lang="en-US" i="1" dirty="0"/>
               <a:t>stepwise</a:t>
             </a:r>
             <a:endParaRPr lang="en-US" dirty="0"/>
-          </a:p>
-          <a:p>
-            <a:r>
-              <a:rPr lang="en-US" dirty="0"/>
-              <a:t>Hypothesis testing</a:t>
-            </a:r>
           </a:p>
           <a:p>
             <a:r>
@@ -7959,56 +7960,6 @@
               <a:t>15</a:t>
             </a:fld>
             <a:endParaRPr lang="en-US" dirty="0"/>
-          </a:p>
-        </p:txBody>
-      </p:sp>
-      <p:sp>
-        <p:nvSpPr>
-          <p:cNvPr id="6" name="Rectangle: Rounded Corners 5">
-            <a:extLst>
-              <a:ext uri="{FF2B5EF4-FFF2-40B4-BE49-F238E27FC236}">
-                <a16:creationId xmlns:a16="http://schemas.microsoft.com/office/drawing/2014/main" id="{E60CBC10-B6FC-4980-A630-3831D668D45A}"/>
-              </a:ext>
-            </a:extLst>
-          </p:cNvPr>
-          <p:cNvSpPr/>
-          <p:nvPr/>
-        </p:nvSpPr>
-        <p:spPr>
-          <a:xfrm>
-            <a:off x="2743199" y="4287714"/>
-            <a:ext cx="6709025" cy="1784312"/>
-          </a:xfrm>
-          <a:prstGeom prst="roundRect">
-            <a:avLst/>
-          </a:prstGeom>
-        </p:spPr>
-        <p:style>
-          <a:lnRef idx="2">
-            <a:schemeClr val="accent4">
-              <a:shade val="50000"/>
-            </a:schemeClr>
-          </a:lnRef>
-          <a:fillRef idx="1">
-            <a:schemeClr val="accent4"/>
-          </a:fillRef>
-          <a:effectRef idx="0">
-            <a:schemeClr val="accent4"/>
-          </a:effectRef>
-          <a:fontRef idx="minor">
-            <a:schemeClr val="lt1"/>
-          </a:fontRef>
-        </p:style>
-        <p:txBody>
-          <a:bodyPr rtlCol="0" anchor="ctr"/>
-          <a:lstStyle/>
-          <a:p>
-            <a:pPr algn="ctr"/>
-            <a:r>
-              <a:rPr lang="en-US" sz="4800" dirty="0"/>
-              <a:t>Live coding examples</a:t>
-            </a:r>
-            <a:endParaRPr lang="en-IL" sz="4800" dirty="0"/>
           </a:p>
         </p:txBody>
       </p:sp>
@@ -8082,7 +8033,19 @@
           <a:p>
             <a:r>
               <a:rPr lang="en-US" dirty="0"/>
-              <a:t>01 - Subset selection, dimension reduction, and variable importance</a:t>
+              <a:t>01 – Linear regression, feature selection, and variable importance</a:t>
+            </a:r>
+          </a:p>
+          <a:p>
+            <a:r>
+              <a:rPr lang="en-US" dirty="0"/>
+              <a:t>Download the file from the LMS</a:t>
+            </a:r>
+          </a:p>
+          <a:p>
+            <a:r>
+              <a:rPr lang="en-US" dirty="0"/>
+              <a:t>Open /exercises/01-flight_prices.R</a:t>
             </a:r>
             <a:endParaRPr lang="he-IL" dirty="0"/>
           </a:p>
@@ -8131,56 +8094,6 @@
               <a:t>16</a:t>
             </a:fld>
             <a:endParaRPr lang="en-US" dirty="0"/>
-          </a:p>
-        </p:txBody>
-      </p:sp>
-      <p:sp>
-        <p:nvSpPr>
-          <p:cNvPr id="6" name="Rectangle: Rounded Corners 5">
-            <a:extLst>
-              <a:ext uri="{FF2B5EF4-FFF2-40B4-BE49-F238E27FC236}">
-                <a16:creationId xmlns:a16="http://schemas.microsoft.com/office/drawing/2014/main" id="{FC62D0E2-855C-4C25-B31D-CDA0A77EA15D}"/>
-              </a:ext>
-            </a:extLst>
-          </p:cNvPr>
-          <p:cNvSpPr/>
-          <p:nvPr/>
-        </p:nvSpPr>
-        <p:spPr>
-          <a:xfrm>
-            <a:off x="2743199" y="2743200"/>
-            <a:ext cx="6709025" cy="2116476"/>
-          </a:xfrm>
-          <a:prstGeom prst="roundRect">
-            <a:avLst/>
-          </a:prstGeom>
-        </p:spPr>
-        <p:style>
-          <a:lnRef idx="2">
-            <a:schemeClr val="accent4">
-              <a:shade val="50000"/>
-            </a:schemeClr>
-          </a:lnRef>
-          <a:fillRef idx="1">
-            <a:schemeClr val="accent4"/>
-          </a:fillRef>
-          <a:effectRef idx="0">
-            <a:schemeClr val="accent4"/>
-          </a:effectRef>
-          <a:fontRef idx="minor">
-            <a:schemeClr val="lt1"/>
-          </a:fontRef>
-        </p:style>
-        <p:txBody>
-          <a:bodyPr rtlCol="0" anchor="ctr"/>
-          <a:lstStyle/>
-          <a:p>
-            <a:pPr algn="ctr"/>
-            <a:r>
-              <a:rPr lang="en-US" sz="4800" dirty="0"/>
-              <a:t>Exercise</a:t>
-            </a:r>
-            <a:endParaRPr lang="en-IL" sz="4800" dirty="0"/>
           </a:p>
         </p:txBody>
       </p:sp>
@@ -8760,8 +8673,8 @@
           </a:p>
         </p:txBody>
       </p:sp>
-      <mc:AlternateContent xmlns:mc="http://schemas.openxmlformats.org/markup-compatibility/2006">
-        <mc:Choice xmlns:a14="http://schemas.microsoft.com/office/drawing/2010/main" Requires="a14">
+      <mc:AlternateContent xmlns:mc="http://schemas.openxmlformats.org/markup-compatibility/2006" xmlns:a14="http://schemas.microsoft.com/office/drawing/2010/main">
+        <mc:Choice Requires="a14">
           <p:sp>
             <p:nvSpPr>
               <p:cNvPr id="3" name="Content Placeholder 2">
@@ -9235,7 +9148,7 @@
             </p:txBody>
           </p:sp>
         </mc:Choice>
-        <mc:Fallback>
+        <mc:Fallback xmlns="">
           <p:sp>
             <p:nvSpPr>
               <p:cNvPr id="3" name="Content Placeholder 2">
@@ -12107,8 +12020,8 @@
           </a:p>
         </p:txBody>
       </p:sp>
-      <mc:AlternateContent xmlns:mc="http://schemas.openxmlformats.org/markup-compatibility/2006">
-        <mc:Choice xmlns:a14="http://schemas.microsoft.com/office/drawing/2010/main" Requires="a14">
+      <mc:AlternateContent xmlns:mc="http://schemas.openxmlformats.org/markup-compatibility/2006" xmlns:a14="http://schemas.microsoft.com/office/drawing/2010/main">
+        <mc:Choice Requires="a14">
           <p:sp>
             <p:nvSpPr>
               <p:cNvPr id="3" name="Content Placeholder 2"/>
@@ -12763,7 +12676,7 @@
             </p:txBody>
           </p:sp>
         </mc:Choice>
-        <mc:Fallback>
+        <mc:Fallback xmlns="">
           <p:sp>
             <p:nvSpPr>
               <p:cNvPr id="3" name="Content Placeholder 2"/>
@@ -13131,8 +13044,8 @@
           </a:p>
         </p:txBody>
       </p:sp>
-      <mc:AlternateContent xmlns:mc="http://schemas.openxmlformats.org/markup-compatibility/2006">
-        <mc:Choice xmlns:a14="http://schemas.microsoft.com/office/drawing/2010/main" Requires="a14">
+      <mc:AlternateContent xmlns:mc="http://schemas.openxmlformats.org/markup-compatibility/2006" xmlns:a14="http://schemas.microsoft.com/office/drawing/2010/main">
+        <mc:Choice Requires="a14">
           <p:sp>
             <p:nvSpPr>
               <p:cNvPr id="3" name="Content Placeholder 2"/>
@@ -13273,7 +13186,7 @@
             </p:txBody>
           </p:sp>
         </mc:Choice>
-        <mc:Fallback>
+        <mc:Fallback xmlns="">
           <p:sp>
             <p:nvSpPr>
               <p:cNvPr id="3" name="Content Placeholder 2"/>
@@ -13361,6 +13274,209 @@
     <p:extLst>
       <p:ext uri="{BB962C8B-B14F-4D97-AF65-F5344CB8AC3E}">
         <p14:creationId xmlns:p14="http://schemas.microsoft.com/office/powerpoint/2010/main" val="3068560513"/>
+      </p:ext>
+    </p:extLst>
+  </p:cSld>
+  <p:clrMapOvr>
+    <a:masterClrMapping/>
+  </p:clrMapOvr>
+</p:sld>
+</file>
+
+<file path=ppt/slides/slide23.xml><?xml version="1.0" encoding="utf-8"?>
+<p:sld xmlns:a="http://schemas.openxmlformats.org/drawingml/2006/main" xmlns:r="http://schemas.openxmlformats.org/officeDocument/2006/relationships" xmlns:p="http://schemas.openxmlformats.org/presentationml/2006/main">
+  <p:cSld>
+    <p:spTree>
+      <p:nvGrpSpPr>
+        <p:cNvPr id="1" name=""/>
+        <p:cNvGrpSpPr/>
+        <p:nvPr/>
+      </p:nvGrpSpPr>
+      <p:grpSpPr>
+        <a:xfrm>
+          <a:off x="0" y="0"/>
+          <a:ext cx="0" cy="0"/>
+          <a:chOff x="0" y="0"/>
+          <a:chExt cx="0" cy="0"/>
+        </a:xfrm>
+      </p:grpSpPr>
+      <p:sp>
+        <p:nvSpPr>
+          <p:cNvPr id="2" name="Title 1">
+            <a:extLst>
+              <a:ext uri="{FF2B5EF4-FFF2-40B4-BE49-F238E27FC236}">
+                <a16:creationId xmlns:a16="http://schemas.microsoft.com/office/drawing/2014/main" id="{4845CB24-5373-4603-9DCF-706277B304EF}"/>
+              </a:ext>
+            </a:extLst>
+          </p:cNvPr>
+          <p:cNvSpPr>
+            <a:spLocks noGrp="1"/>
+          </p:cNvSpPr>
+          <p:nvPr>
+            <p:ph type="title"/>
+          </p:nvPr>
+        </p:nvSpPr>
+        <p:spPr/>
+        <p:txBody>
+          <a:bodyPr/>
+          <a:lstStyle/>
+          <a:p>
+            <a:r>
+              <a:rPr lang="en-US" dirty="0"/>
+              <a:t>Comes – regularization</a:t>
+            </a:r>
+            <a:endParaRPr lang="en-IL" dirty="0"/>
+          </a:p>
+        </p:txBody>
+      </p:sp>
+      <mc:AlternateContent xmlns:mc="http://schemas.openxmlformats.org/markup-compatibility/2006">
+        <mc:Choice xmlns:a14="http://schemas.microsoft.com/office/drawing/2010/main" Requires="a14">
+          <p:sp>
+            <p:nvSpPr>
+              <p:cNvPr id="3" name="Content Placeholder 2">
+                <a:extLst>
+                  <a:ext uri="{FF2B5EF4-FFF2-40B4-BE49-F238E27FC236}">
+                    <a16:creationId xmlns:a16="http://schemas.microsoft.com/office/drawing/2014/main" id="{7599A068-F72C-4867-AEF4-1896408D88E6}"/>
+                  </a:ext>
+                </a:extLst>
+              </p:cNvPr>
+              <p:cNvSpPr>
+                <a:spLocks noGrp="1"/>
+              </p:cNvSpPr>
+              <p:nvPr>
+                <p:ph idx="1"/>
+              </p:nvPr>
+            </p:nvSpPr>
+            <p:spPr/>
+            <p:txBody>
+              <a:bodyPr/>
+              <a:lstStyle/>
+              <a:p>
+                <a:r>
+                  <a:rPr lang="en-US" dirty="0"/>
+                  <a:t>Imposing penalties or constraints on the </a:t>
+                </a:r>
+                <a14:m>
+                  <m:oMath xmlns:m="http://schemas.openxmlformats.org/officeDocument/2006/math">
+                    <m:r>
+                      <a:rPr lang="en-US" b="0" i="1" smtClean="0">
+                        <a:latin typeface="Cambria Math" panose="02040503050406030204" pitchFamily="18" charset="0"/>
+                      </a:rPr>
+                      <m:t>𝛽</m:t>
+                    </m:r>
+                  </m:oMath>
+                </a14:m>
+                <a:r>
+                  <a:rPr lang="en-US" dirty="0"/>
+                  <a:t> coefficients.</a:t>
+                </a:r>
+                <a:endParaRPr lang="en-IL" dirty="0"/>
+              </a:p>
+            </p:txBody>
+          </p:sp>
+        </mc:Choice>
+        <mc:Fallback>
+          <p:sp>
+            <p:nvSpPr>
+              <p:cNvPr id="3" name="Content Placeholder 2">
+                <a:extLst>
+                  <a:ext uri="{FF2B5EF4-FFF2-40B4-BE49-F238E27FC236}">
+                    <a16:creationId xmlns:a16="http://schemas.microsoft.com/office/drawing/2014/main" id="{7599A068-F72C-4867-AEF4-1896408D88E6}"/>
+                  </a:ext>
+                </a:extLst>
+              </p:cNvPr>
+              <p:cNvSpPr>
+                <a:spLocks noGrp="1" noRot="1" noChangeAspect="1" noMove="1" noResize="1" noEditPoints="1" noAdjustHandles="1" noChangeArrowheads="1" noChangeShapeType="1" noTextEdit="1"/>
+              </p:cNvSpPr>
+              <p:nvPr>
+                <p:ph idx="1"/>
+              </p:nvPr>
+            </p:nvSpPr>
+            <p:spPr>
+              <a:blipFill>
+                <a:blip r:embed="rId2"/>
+                <a:stretch>
+                  <a:fillRect l="-303" t="-1504"/>
+                </a:stretch>
+              </a:blipFill>
+            </p:spPr>
+            <p:txBody>
+              <a:bodyPr/>
+              <a:lstStyle/>
+              <a:p>
+                <a:r>
+                  <a:rPr lang="en-IL">
+                    <a:noFill/>
+                  </a:rPr>
+                  <a:t> </a:t>
+                </a:r>
+              </a:p>
+            </p:txBody>
+          </p:sp>
+        </mc:Fallback>
+      </mc:AlternateContent>
+      <p:sp>
+        <p:nvSpPr>
+          <p:cNvPr id="4" name="Footer Placeholder 3">
+            <a:extLst>
+              <a:ext uri="{FF2B5EF4-FFF2-40B4-BE49-F238E27FC236}">
+                <a16:creationId xmlns:a16="http://schemas.microsoft.com/office/drawing/2014/main" id="{90E31FC7-636A-4A88-9C04-0D11D8F97A2D}"/>
+              </a:ext>
+            </a:extLst>
+          </p:cNvPr>
+          <p:cNvSpPr>
+            <a:spLocks noGrp="1"/>
+          </p:cNvSpPr>
+          <p:nvPr>
+            <p:ph type="ftr" sz="quarter" idx="11"/>
+          </p:nvPr>
+        </p:nvSpPr>
+        <p:spPr/>
+        <p:txBody>
+          <a:bodyPr/>
+          <a:lstStyle/>
+          <a:p>
+            <a:r>
+              <a:rPr lang="en-US"/>
+              <a:t>Materials by Adi Sarid https://adisarid.github.io and http://www.sarid-ins.com</a:t>
+            </a:r>
+            <a:endParaRPr lang="en-US" dirty="0"/>
+          </a:p>
+        </p:txBody>
+      </p:sp>
+      <p:sp>
+        <p:nvSpPr>
+          <p:cNvPr id="5" name="Slide Number Placeholder 4">
+            <a:extLst>
+              <a:ext uri="{FF2B5EF4-FFF2-40B4-BE49-F238E27FC236}">
+                <a16:creationId xmlns:a16="http://schemas.microsoft.com/office/drawing/2014/main" id="{570B64F1-F326-4F73-982A-5CC370E6464B}"/>
+              </a:ext>
+            </a:extLst>
+          </p:cNvPr>
+          <p:cNvSpPr>
+            <a:spLocks noGrp="1"/>
+          </p:cNvSpPr>
+          <p:nvPr>
+            <p:ph type="sldNum" sz="quarter" idx="12"/>
+          </p:nvPr>
+        </p:nvSpPr>
+        <p:spPr/>
+        <p:txBody>
+          <a:bodyPr/>
+          <a:lstStyle/>
+          <a:p>
+            <a:fld id="{4FAB73BC-B049-4115-A692-8D63A059BFB8}" type="slidenum">
+              <a:rPr lang="en-US" smtClean="0"/>
+              <a:t>23</a:t>
+            </a:fld>
+            <a:endParaRPr lang="en-US" dirty="0"/>
+          </a:p>
+        </p:txBody>
+      </p:sp>
+    </p:spTree>
+    <p:extLst>
+      <p:ext uri="{BB962C8B-B14F-4D97-AF65-F5344CB8AC3E}">
+        <p14:creationId xmlns:p14="http://schemas.microsoft.com/office/powerpoint/2010/main" val="1084178654"/>
       </p:ext>
     </p:extLst>
   </p:cSld>
@@ -15402,8 +15518,8 @@
           </a:p>
         </p:txBody>
       </p:sp>
-      <mc:AlternateContent xmlns:mc="http://schemas.openxmlformats.org/markup-compatibility/2006">
-        <mc:Choice xmlns:a14="http://schemas.microsoft.com/office/drawing/2010/main" Requires="a14">
+      <mc:AlternateContent xmlns:mc="http://schemas.openxmlformats.org/markup-compatibility/2006" xmlns:a14="http://schemas.microsoft.com/office/drawing/2010/main">
+        <mc:Choice Requires="a14">
           <p:sp>
             <p:nvSpPr>
               <p:cNvPr id="3" name="Content Placeholder 2"/>
@@ -15534,7 +15650,7 @@
             </p:txBody>
           </p:sp>
         </mc:Choice>
-        <mc:Fallback>
+        <mc:Fallback xmlns="">
           <p:sp>
             <p:nvSpPr>
               <p:cNvPr id="3" name="Content Placeholder 2"/>
@@ -15634,8 +15750,8 @@
             <a:chExt cx="2686303" cy="910699"/>
           </a:xfrm>
         </p:grpSpPr>
-        <mc:AlternateContent xmlns:mc="http://schemas.openxmlformats.org/markup-compatibility/2006">
-          <mc:Choice xmlns:a14="http://schemas.microsoft.com/office/drawing/2010/main" Requires="a14">
+        <mc:AlternateContent xmlns:mc="http://schemas.openxmlformats.org/markup-compatibility/2006" xmlns:a14="http://schemas.microsoft.com/office/drawing/2010/main">
+          <mc:Choice Requires="a14">
             <p:sp>
               <p:nvSpPr>
                 <p:cNvPr id="8" name="Rectangle 7"/>
@@ -15771,7 +15887,7 @@
               </p:txBody>
             </p:sp>
           </mc:Choice>
-          <mc:Fallback>
+          <mc:Fallback xmlns="">
             <p:sp>
               <p:nvSpPr>
                 <p:cNvPr id="8" name="Rectangle 7"/>
@@ -15861,8 +15977,8 @@
             <a:chExt cx="2432310" cy="848566"/>
           </a:xfrm>
         </p:grpSpPr>
-        <mc:AlternateContent xmlns:mc="http://schemas.openxmlformats.org/markup-compatibility/2006">
-          <mc:Choice xmlns:a14="http://schemas.microsoft.com/office/drawing/2010/main" Requires="a14">
+        <mc:AlternateContent xmlns:mc="http://schemas.openxmlformats.org/markup-compatibility/2006" xmlns:a14="http://schemas.microsoft.com/office/drawing/2010/main">
+          <mc:Choice Requires="a14">
             <p:sp>
               <p:nvSpPr>
                 <p:cNvPr id="6" name="Rectangle 5"/>
@@ -16065,7 +16181,7 @@
               </p:txBody>
             </p:sp>
           </mc:Choice>
-          <mc:Fallback>
+          <mc:Fallback xmlns="">
             <p:sp>
               <p:nvSpPr>
                 <p:cNvPr id="6" name="Rectangle 5"/>
@@ -16155,8 +16271,8 @@
             <a:chExt cx="3256600" cy="848566"/>
           </a:xfrm>
         </p:grpSpPr>
-        <mc:AlternateContent xmlns:mc="http://schemas.openxmlformats.org/markup-compatibility/2006">
-          <mc:Choice xmlns:a14="http://schemas.microsoft.com/office/drawing/2010/main" Requires="a14">
+        <mc:AlternateContent xmlns:mc="http://schemas.openxmlformats.org/markup-compatibility/2006" xmlns:a14="http://schemas.microsoft.com/office/drawing/2010/main">
+          <mc:Choice Requires="a14">
             <p:sp>
               <p:nvSpPr>
                 <p:cNvPr id="9" name="Rectangle 8"/>
@@ -16349,7 +16465,7 @@
               </p:txBody>
             </p:sp>
           </mc:Choice>
-          <mc:Fallback>
+          <mc:Fallback xmlns="">
             <p:sp>
               <p:nvSpPr>
                 <p:cNvPr id="9" name="Rectangle 8"/>
@@ -16469,8 +16585,8 @@
             </a:fontRef>
           </p:style>
         </p:cxnSp>
-        <mc:AlternateContent xmlns:mc="http://schemas.openxmlformats.org/markup-compatibility/2006">
-          <mc:Choice xmlns:a14="http://schemas.microsoft.com/office/drawing/2010/main" Requires="a14">
+        <mc:AlternateContent xmlns:mc="http://schemas.openxmlformats.org/markup-compatibility/2006" xmlns:a14="http://schemas.microsoft.com/office/drawing/2010/main">
+          <mc:Choice Requires="a14">
             <p:sp>
               <p:nvSpPr>
                 <p:cNvPr id="17" name="Rectangle 16"/>
@@ -16568,7 +16684,7 @@
               </p:txBody>
             </p:sp>
           </mc:Choice>
-          <mc:Fallback>
+          <mc:Fallback xmlns="">
             <p:sp>
               <p:nvSpPr>
                 <p:cNvPr id="17" name="Rectangle 16"/>
@@ -16628,8 +16744,8 @@
             <a:chExt cx="1677838" cy="369332"/>
           </a:xfrm>
         </p:grpSpPr>
-        <mc:AlternateContent xmlns:mc="http://schemas.openxmlformats.org/markup-compatibility/2006">
-          <mc:Choice xmlns:a14="http://schemas.microsoft.com/office/drawing/2010/main" Requires="a14">
+        <mc:AlternateContent xmlns:mc="http://schemas.openxmlformats.org/markup-compatibility/2006" xmlns:a14="http://schemas.microsoft.com/office/drawing/2010/main">
+          <mc:Choice Requires="a14">
             <p:sp>
               <p:nvSpPr>
                 <p:cNvPr id="7" name="Rectangle 6"/>
@@ -16765,7 +16881,7 @@
               </p:txBody>
             </p:sp>
           </mc:Choice>
-          <mc:Fallback>
+          <mc:Fallback xmlns="">
             <p:sp>
               <p:nvSpPr>
                 <p:cNvPr id="7" name="Rectangle 6"/>
@@ -16855,8 +16971,8 @@
             <a:chExt cx="3291234" cy="466090"/>
           </a:xfrm>
         </p:grpSpPr>
-        <mc:AlternateContent xmlns:mc="http://schemas.openxmlformats.org/markup-compatibility/2006">
-          <mc:Choice xmlns:a14="http://schemas.microsoft.com/office/drawing/2010/main" Requires="a14">
+        <mc:AlternateContent xmlns:mc="http://schemas.openxmlformats.org/markup-compatibility/2006" xmlns:a14="http://schemas.microsoft.com/office/drawing/2010/main">
+          <mc:Choice Requires="a14">
             <p:sp>
               <p:nvSpPr>
                 <p:cNvPr id="21" name="Rectangle 20"/>
@@ -17105,7 +17221,7 @@
               </p:txBody>
             </p:sp>
           </mc:Choice>
-          <mc:Fallback>
+          <mc:Fallback xmlns="">
             <p:sp>
               <p:nvSpPr>
                 <p:cNvPr id="21" name="Rectangle 20"/>
@@ -17231,8 +17347,8 @@
             </a:fontRef>
           </p:style>
         </p:cxnSp>
-        <mc:AlternateContent xmlns:mc="http://schemas.openxmlformats.org/markup-compatibility/2006">
-          <mc:Choice xmlns:a14="http://schemas.microsoft.com/office/drawing/2010/main" Requires="a14">
+        <mc:AlternateContent xmlns:mc="http://schemas.openxmlformats.org/markup-compatibility/2006" xmlns:a14="http://schemas.microsoft.com/office/drawing/2010/main">
+          <mc:Choice Requires="a14">
             <p:sp>
               <p:nvSpPr>
                 <p:cNvPr id="26" name="Rectangle 25">
@@ -17363,19 +17479,7 @@
                           <a:rPr lang="en-US" b="0" i="1" smtClean="0">
                             <a:latin typeface="Cambria Math" panose="02040503050406030204" pitchFamily="18" charset="0"/>
                           </a:rPr>
-                          <m:t>)</m:t>
-                        </m:r>
-                        <m:r>
-                          <a:rPr lang="en-US" b="0" i="1" smtClean="0">
-                            <a:latin typeface="Cambria Math" panose="02040503050406030204" pitchFamily="18" charset="0"/>
-                          </a:rPr>
-                          <m:t>/</m:t>
-                        </m:r>
-                        <m:r>
-                          <a:rPr lang="en-US" b="0" i="1" smtClean="0">
-                            <a:latin typeface="Cambria Math" panose="02040503050406030204" pitchFamily="18" charset="0"/>
-                          </a:rPr>
-                          <m:t>(</m:t>
+                          <m:t>)/(</m:t>
                         </m:r>
                         <m:f>
                           <m:fPr>
@@ -17428,7 +17532,7 @@
               </p:txBody>
             </p:sp>
           </mc:Choice>
-          <mc:Fallback>
+          <mc:Fallback xmlns="">
             <p:sp>
               <p:nvSpPr>
                 <p:cNvPr id="26" name="Rectangle 25">

</xml_diff>

<commit_message>
updated lm methods conceptual chart and added summary
</commit_message>
<xml_diff>
--- a/presentation/pptx/01-Linear_regression_methods.pptx
+++ b/presentation/pptx/01-Linear_regression_methods.pptx
@@ -5,7 +5,7 @@
     <p:sldMasterId id="2147483840" r:id="rId1"/>
   </p:sldMasterIdLst>
   <p:notesMasterIdLst>
-    <p:notesMasterId r:id="rId25"/>
+    <p:notesMasterId r:id="rId27"/>
   </p:notesMasterIdLst>
   <p:sldIdLst>
     <p:sldId id="256" r:id="rId2"/>
@@ -23,14 +23,16 @@
     <p:sldId id="268" r:id="rId14"/>
     <p:sldId id="275" r:id="rId15"/>
     <p:sldId id="267" r:id="rId16"/>
-    <p:sldId id="273" r:id="rId17"/>
-    <p:sldId id="272" r:id="rId18"/>
-    <p:sldId id="274" r:id="rId19"/>
+    <p:sldId id="272" r:id="rId17"/>
+    <p:sldId id="274" r:id="rId18"/>
+    <p:sldId id="273" r:id="rId19"/>
     <p:sldId id="269" r:id="rId20"/>
     <p:sldId id="270" r:id="rId21"/>
     <p:sldId id="281" r:id="rId22"/>
     <p:sldId id="261" r:id="rId23"/>
     <p:sldId id="282" r:id="rId24"/>
+    <p:sldId id="284" r:id="rId25"/>
+    <p:sldId id="283" r:id="rId26"/>
   </p:sldIdLst>
   <p:sldSz cx="12192000" cy="6858000"/>
   <p:notesSz cx="6858000" cy="9144000"/>
@@ -8010,7 +8012,7 @@
           <a:p>
             <a:r>
               <a:rPr lang="en-US" dirty="0"/>
-              <a:t>Exercise</a:t>
+              <a:t>The influence of outliers</a:t>
             </a:r>
             <a:endParaRPr lang="he-IL" dirty="0"/>
           </a:p>
@@ -8028,26 +8030,56 @@
         </p:nvSpPr>
         <p:spPr/>
         <p:txBody>
-          <a:bodyPr/>
+          <a:bodyPr>
+            <a:normAutofit/>
+          </a:bodyPr>
           <a:lstStyle/>
           <a:p>
             <a:r>
               <a:rPr lang="en-US" dirty="0"/>
-              <a:t>01 – Linear regression, feature selection, and variable importance</a:t>
+              <a:t>How to detect an outlier? e.g. using a boxplot</a:t>
             </a:r>
           </a:p>
           <a:p>
             <a:r>
               <a:rPr lang="en-US" dirty="0"/>
-              <a:t>Download the file from the LMS</a:t>
-            </a:r>
+              <a:t>But, is that enough? a short quiz</a:t>
+            </a:r>
+          </a:p>
+          <a:p>
+            <a:endParaRPr lang="en-US" dirty="0"/>
+          </a:p>
+          <a:p>
+            <a:endParaRPr lang="en-US" dirty="0"/>
           </a:p>
           <a:p>
             <a:r>
               <a:rPr lang="en-US" dirty="0"/>
-              <a:t>Open /exercises/01-flight_prices.R</a:t>
-            </a:r>
-            <a:endParaRPr lang="he-IL" dirty="0"/>
+              <a:t>Live coding example: /class code/01-outliers.R</a:t>
+            </a:r>
+          </a:p>
+          <a:p>
+            <a:endParaRPr lang="en-US" dirty="0"/>
+          </a:p>
+          <a:p>
+            <a:r>
+              <a:rPr lang="en-US" dirty="0"/>
+              <a:t>Mitigation:</a:t>
+            </a:r>
+          </a:p>
+          <a:p>
+            <a:pPr lvl="1"/>
+            <a:r>
+              <a:rPr lang="en-US" dirty="0"/>
+              <a:t>Quantile regression</a:t>
+            </a:r>
+          </a:p>
+          <a:p>
+            <a:pPr lvl="1"/>
+            <a:r>
+              <a:rPr lang="en-US" dirty="0"/>
+              <a:t>Outlier detection (out of scope for now)</a:t>
+            </a:r>
           </a:p>
         </p:txBody>
       </p:sp>
@@ -8092,170 +8124,6 @@
             <a:fld id="{4FAB73BC-B049-4115-A692-8D63A059BFB8}" type="slidenum">
               <a:rPr lang="en-US" smtClean="0"/>
               <a:t>16</a:t>
-            </a:fld>
-            <a:endParaRPr lang="en-US" dirty="0"/>
-          </a:p>
-        </p:txBody>
-      </p:sp>
-    </p:spTree>
-    <p:extLst>
-      <p:ext uri="{BB962C8B-B14F-4D97-AF65-F5344CB8AC3E}">
-        <p14:creationId xmlns:p14="http://schemas.microsoft.com/office/powerpoint/2010/main" val="2921006448"/>
-      </p:ext>
-    </p:extLst>
-  </p:cSld>
-  <p:clrMapOvr>
-    <a:masterClrMapping/>
-  </p:clrMapOvr>
-</p:sld>
-</file>
-
-<file path=ppt/slides/slide17.xml><?xml version="1.0" encoding="utf-8"?>
-<p:sld xmlns:a="http://schemas.openxmlformats.org/drawingml/2006/main" xmlns:r="http://schemas.openxmlformats.org/officeDocument/2006/relationships" xmlns:p="http://schemas.openxmlformats.org/presentationml/2006/main">
-  <p:cSld>
-    <p:spTree>
-      <p:nvGrpSpPr>
-        <p:cNvPr id="1" name=""/>
-        <p:cNvGrpSpPr/>
-        <p:nvPr/>
-      </p:nvGrpSpPr>
-      <p:grpSpPr>
-        <a:xfrm>
-          <a:off x="0" y="0"/>
-          <a:ext cx="0" cy="0"/>
-          <a:chOff x="0" y="0"/>
-          <a:chExt cx="0" cy="0"/>
-        </a:xfrm>
-      </p:grpSpPr>
-      <p:sp>
-        <p:nvSpPr>
-          <p:cNvPr id="2" name="Title 1"/>
-          <p:cNvSpPr>
-            <a:spLocks noGrp="1"/>
-          </p:cNvSpPr>
-          <p:nvPr>
-            <p:ph type="title"/>
-          </p:nvPr>
-        </p:nvSpPr>
-        <p:spPr/>
-        <p:txBody>
-          <a:bodyPr/>
-          <a:lstStyle/>
-          <a:p>
-            <a:r>
-              <a:rPr lang="en-US" dirty="0"/>
-              <a:t>The influence of outliers</a:t>
-            </a:r>
-            <a:endParaRPr lang="he-IL" dirty="0"/>
-          </a:p>
-        </p:txBody>
-      </p:sp>
-      <p:sp>
-        <p:nvSpPr>
-          <p:cNvPr id="3" name="Content Placeholder 2"/>
-          <p:cNvSpPr>
-            <a:spLocks noGrp="1"/>
-          </p:cNvSpPr>
-          <p:nvPr>
-            <p:ph idx="1"/>
-          </p:nvPr>
-        </p:nvSpPr>
-        <p:spPr/>
-        <p:txBody>
-          <a:bodyPr>
-            <a:normAutofit/>
-          </a:bodyPr>
-          <a:lstStyle/>
-          <a:p>
-            <a:r>
-              <a:rPr lang="en-US" dirty="0"/>
-              <a:t>How to detect an outlier? e.g. using a boxplot</a:t>
-            </a:r>
-          </a:p>
-          <a:p>
-            <a:r>
-              <a:rPr lang="en-US" dirty="0"/>
-              <a:t>But, is that enough? a short quiz</a:t>
-            </a:r>
-          </a:p>
-          <a:p>
-            <a:endParaRPr lang="en-US" dirty="0"/>
-          </a:p>
-          <a:p>
-            <a:endParaRPr lang="en-US" dirty="0"/>
-          </a:p>
-          <a:p>
-            <a:r>
-              <a:rPr lang="en-US" dirty="0"/>
-              <a:t>Live coding example: /class code/01-outliers.R</a:t>
-            </a:r>
-          </a:p>
-          <a:p>
-            <a:endParaRPr lang="en-US" dirty="0"/>
-          </a:p>
-          <a:p>
-            <a:r>
-              <a:rPr lang="en-US" dirty="0"/>
-              <a:t>Mitigation:</a:t>
-            </a:r>
-          </a:p>
-          <a:p>
-            <a:pPr lvl="1"/>
-            <a:r>
-              <a:rPr lang="en-US" dirty="0"/>
-              <a:t>Quantile regression</a:t>
-            </a:r>
-          </a:p>
-          <a:p>
-            <a:pPr lvl="1"/>
-            <a:r>
-              <a:rPr lang="en-US" dirty="0"/>
-              <a:t>Outlier detection (out of scope for now)</a:t>
-            </a:r>
-          </a:p>
-        </p:txBody>
-      </p:sp>
-      <p:sp>
-        <p:nvSpPr>
-          <p:cNvPr id="4" name="Footer Placeholder 3"/>
-          <p:cNvSpPr>
-            <a:spLocks noGrp="1"/>
-          </p:cNvSpPr>
-          <p:nvPr>
-            <p:ph type="ftr" sz="quarter" idx="11"/>
-          </p:nvPr>
-        </p:nvSpPr>
-        <p:spPr/>
-        <p:txBody>
-          <a:bodyPr/>
-          <a:lstStyle/>
-          <a:p>
-            <a:r>
-              <a:rPr lang="en-US"/>
-              <a:t>Materials by Adi Sarid https://adisarid.github.io and http://www.sarid-ins.com</a:t>
-            </a:r>
-            <a:endParaRPr lang="en-US" dirty="0"/>
-          </a:p>
-        </p:txBody>
-      </p:sp>
-      <p:sp>
-        <p:nvSpPr>
-          <p:cNvPr id="5" name="Slide Number Placeholder 4"/>
-          <p:cNvSpPr>
-            <a:spLocks noGrp="1"/>
-          </p:cNvSpPr>
-          <p:nvPr>
-            <p:ph type="sldNum" sz="quarter" idx="12"/>
-          </p:nvPr>
-        </p:nvSpPr>
-        <p:spPr/>
-        <p:txBody>
-          <a:bodyPr/>
-          <a:lstStyle/>
-          <a:p>
-            <a:fld id="{4FAB73BC-B049-4115-A692-8D63A059BFB8}" type="slidenum">
-              <a:rPr lang="en-US" smtClean="0"/>
-              <a:t>17</a:t>
             </a:fld>
             <a:endParaRPr lang="en-US" dirty="0"/>
           </a:p>
@@ -8627,7 +8495,7 @@
 </p:sld>
 </file>
 
-<file path=ppt/slides/slide18.xml><?xml version="1.0" encoding="utf-8"?>
+<file path=ppt/slides/slide17.xml><?xml version="1.0" encoding="utf-8"?>
 <p:sld xmlns:a="http://schemas.openxmlformats.org/drawingml/2006/main" xmlns:r="http://schemas.openxmlformats.org/officeDocument/2006/relationships" xmlns:p="http://schemas.openxmlformats.org/presentationml/2006/main">
   <p:cSld>
     <p:spTree>
@@ -9240,7 +9108,7 @@
           <a:p>
             <a:fld id="{4FAB73BC-B049-4115-A692-8D63A059BFB8}" type="slidenum">
               <a:rPr lang="en-US" smtClean="0"/>
-              <a:t>18</a:t>
+              <a:t>17</a:t>
             </a:fld>
             <a:endParaRPr lang="en-US" dirty="0"/>
           </a:p>
@@ -9250,6 +9118,140 @@
     <p:extLst>
       <p:ext uri="{BB962C8B-B14F-4D97-AF65-F5344CB8AC3E}">
         <p14:creationId xmlns:p14="http://schemas.microsoft.com/office/powerpoint/2010/main" val="827681978"/>
+      </p:ext>
+    </p:extLst>
+  </p:cSld>
+  <p:clrMapOvr>
+    <a:masterClrMapping/>
+  </p:clrMapOvr>
+</p:sld>
+</file>
+
+<file path=ppt/slides/slide18.xml><?xml version="1.0" encoding="utf-8"?>
+<p:sld xmlns:a="http://schemas.openxmlformats.org/drawingml/2006/main" xmlns:r="http://schemas.openxmlformats.org/officeDocument/2006/relationships" xmlns:p="http://schemas.openxmlformats.org/presentationml/2006/main">
+  <p:cSld>
+    <p:spTree>
+      <p:nvGrpSpPr>
+        <p:cNvPr id="1" name=""/>
+        <p:cNvGrpSpPr/>
+        <p:nvPr/>
+      </p:nvGrpSpPr>
+      <p:grpSpPr>
+        <a:xfrm>
+          <a:off x="0" y="0"/>
+          <a:ext cx="0" cy="0"/>
+          <a:chOff x="0" y="0"/>
+          <a:chExt cx="0" cy="0"/>
+        </a:xfrm>
+      </p:grpSpPr>
+      <p:sp>
+        <p:nvSpPr>
+          <p:cNvPr id="2" name="Title 1"/>
+          <p:cNvSpPr>
+            <a:spLocks noGrp="1"/>
+          </p:cNvSpPr>
+          <p:nvPr>
+            <p:ph type="title"/>
+          </p:nvPr>
+        </p:nvSpPr>
+        <p:spPr/>
+        <p:txBody>
+          <a:bodyPr/>
+          <a:lstStyle/>
+          <a:p>
+            <a:r>
+              <a:rPr lang="en-US" dirty="0"/>
+              <a:t>Exercise</a:t>
+            </a:r>
+            <a:endParaRPr lang="he-IL" dirty="0"/>
+          </a:p>
+        </p:txBody>
+      </p:sp>
+      <p:sp>
+        <p:nvSpPr>
+          <p:cNvPr id="3" name="Content Placeholder 2"/>
+          <p:cNvSpPr>
+            <a:spLocks noGrp="1"/>
+          </p:cNvSpPr>
+          <p:nvPr>
+            <p:ph idx="1"/>
+          </p:nvPr>
+        </p:nvSpPr>
+        <p:spPr/>
+        <p:txBody>
+          <a:bodyPr/>
+          <a:lstStyle/>
+          <a:p>
+            <a:r>
+              <a:rPr lang="en-US" dirty="0"/>
+              <a:t>01 – Linear regression, feature selection, and variable importance</a:t>
+            </a:r>
+          </a:p>
+          <a:p>
+            <a:r>
+              <a:rPr lang="en-US" dirty="0"/>
+              <a:t>Download the file from the LMS</a:t>
+            </a:r>
+          </a:p>
+          <a:p>
+            <a:r>
+              <a:rPr lang="en-US" dirty="0"/>
+              <a:t>Open /exercises/01-flight_prices.R</a:t>
+            </a:r>
+            <a:endParaRPr lang="he-IL" dirty="0"/>
+          </a:p>
+        </p:txBody>
+      </p:sp>
+      <p:sp>
+        <p:nvSpPr>
+          <p:cNvPr id="4" name="Footer Placeholder 3"/>
+          <p:cNvSpPr>
+            <a:spLocks noGrp="1"/>
+          </p:cNvSpPr>
+          <p:nvPr>
+            <p:ph type="ftr" sz="quarter" idx="11"/>
+          </p:nvPr>
+        </p:nvSpPr>
+        <p:spPr/>
+        <p:txBody>
+          <a:bodyPr/>
+          <a:lstStyle/>
+          <a:p>
+            <a:r>
+              <a:rPr lang="en-US"/>
+              <a:t>Materials by Adi Sarid https://adisarid.github.io and http://www.sarid-ins.com</a:t>
+            </a:r>
+            <a:endParaRPr lang="en-US" dirty="0"/>
+          </a:p>
+        </p:txBody>
+      </p:sp>
+      <p:sp>
+        <p:nvSpPr>
+          <p:cNvPr id="5" name="Slide Number Placeholder 4"/>
+          <p:cNvSpPr>
+            <a:spLocks noGrp="1"/>
+          </p:cNvSpPr>
+          <p:nvPr>
+            <p:ph type="sldNum" sz="quarter" idx="12"/>
+          </p:nvPr>
+        </p:nvSpPr>
+        <p:spPr/>
+        <p:txBody>
+          <a:bodyPr/>
+          <a:lstStyle/>
+          <a:p>
+            <a:fld id="{4FAB73BC-B049-4115-A692-8D63A059BFB8}" type="slidenum">
+              <a:rPr lang="en-US" smtClean="0"/>
+              <a:t>18</a:t>
+            </a:fld>
+            <a:endParaRPr lang="en-US" dirty="0"/>
+          </a:p>
+        </p:txBody>
+      </p:sp>
+    </p:spTree>
+    <p:extLst>
+      <p:ext uri="{BB962C8B-B14F-4D97-AF65-F5344CB8AC3E}">
+        <p14:creationId xmlns:p14="http://schemas.microsoft.com/office/powerpoint/2010/main" val="2921006448"/>
       </p:ext>
     </p:extLst>
   </p:cSld>
@@ -13477,6 +13479,1462 @@
     <p:extLst>
       <p:ext uri="{BB962C8B-B14F-4D97-AF65-F5344CB8AC3E}">
         <p14:creationId xmlns:p14="http://schemas.microsoft.com/office/powerpoint/2010/main" val="1084178654"/>
+      </p:ext>
+    </p:extLst>
+  </p:cSld>
+  <p:clrMapOvr>
+    <a:masterClrMapping/>
+  </p:clrMapOvr>
+</p:sld>
+</file>
+
+<file path=ppt/slides/slide24.xml><?xml version="1.0" encoding="utf-8"?>
+<p:sld xmlns:a="http://schemas.openxmlformats.org/drawingml/2006/main" xmlns:r="http://schemas.openxmlformats.org/officeDocument/2006/relationships" xmlns:p="http://schemas.openxmlformats.org/presentationml/2006/main">
+  <p:cSld>
+    <p:spTree>
+      <p:nvGrpSpPr>
+        <p:cNvPr id="1" name=""/>
+        <p:cNvGrpSpPr/>
+        <p:nvPr/>
+      </p:nvGrpSpPr>
+      <p:grpSpPr>
+        <a:xfrm>
+          <a:off x="0" y="0"/>
+          <a:ext cx="0" cy="0"/>
+          <a:chOff x="0" y="0"/>
+          <a:chExt cx="0" cy="0"/>
+        </a:xfrm>
+      </p:grpSpPr>
+      <p:sp>
+        <p:nvSpPr>
+          <p:cNvPr id="2" name="Title 1"/>
+          <p:cNvSpPr>
+            <a:spLocks noGrp="1"/>
+          </p:cNvSpPr>
+          <p:nvPr>
+            <p:ph type="title"/>
+          </p:nvPr>
+        </p:nvSpPr>
+        <p:spPr/>
+        <p:txBody>
+          <a:bodyPr/>
+          <a:lstStyle/>
+          <a:p>
+            <a:r>
+              <a:rPr lang="en-US" dirty="0"/>
+              <a:t>Contents</a:t>
+            </a:r>
+            <a:endParaRPr lang="he-IL" dirty="0"/>
+          </a:p>
+        </p:txBody>
+      </p:sp>
+      <p:sp>
+        <p:nvSpPr>
+          <p:cNvPr id="4" name="Footer Placeholder 3"/>
+          <p:cNvSpPr>
+            <a:spLocks noGrp="1"/>
+          </p:cNvSpPr>
+          <p:nvPr>
+            <p:ph type="ftr" sz="quarter" idx="11"/>
+          </p:nvPr>
+        </p:nvSpPr>
+        <p:spPr/>
+        <p:txBody>
+          <a:bodyPr/>
+          <a:lstStyle/>
+          <a:p>
+            <a:r>
+              <a:rPr lang="en-US"/>
+              <a:t>Materials by Adi Sarid https://adisarid.github.io and http://www.sarid-ins.com</a:t>
+            </a:r>
+            <a:endParaRPr lang="en-US" dirty="0"/>
+          </a:p>
+        </p:txBody>
+      </p:sp>
+      <p:sp>
+        <p:nvSpPr>
+          <p:cNvPr id="5" name="Slide Number Placeholder 4"/>
+          <p:cNvSpPr>
+            <a:spLocks noGrp="1"/>
+          </p:cNvSpPr>
+          <p:nvPr>
+            <p:ph type="sldNum" sz="quarter" idx="12"/>
+          </p:nvPr>
+        </p:nvSpPr>
+        <p:spPr/>
+        <p:txBody>
+          <a:bodyPr/>
+          <a:lstStyle/>
+          <a:p>
+            <a:fld id="{4FAB73BC-B049-4115-A692-8D63A059BFB8}" type="slidenum">
+              <a:rPr lang="en-US" smtClean="0"/>
+              <a:t>24</a:t>
+            </a:fld>
+            <a:endParaRPr lang="en-US" dirty="0"/>
+          </a:p>
+        </p:txBody>
+      </p:sp>
+      <p:sp>
+        <p:nvSpPr>
+          <p:cNvPr id="6" name="Rounded Rectangle 5"/>
+          <p:cNvSpPr/>
+          <p:nvPr/>
+        </p:nvSpPr>
+        <p:spPr>
+          <a:xfrm>
+            <a:off x="3377903" y="2000920"/>
+            <a:ext cx="1775012" cy="623943"/>
+          </a:xfrm>
+          <a:prstGeom prst="roundRect">
+            <a:avLst/>
+          </a:prstGeom>
+        </p:spPr>
+        <p:style>
+          <a:lnRef idx="3">
+            <a:schemeClr val="lt1"/>
+          </a:lnRef>
+          <a:fillRef idx="1">
+            <a:schemeClr val="accent2"/>
+          </a:fillRef>
+          <a:effectRef idx="1">
+            <a:schemeClr val="accent2"/>
+          </a:effectRef>
+          <a:fontRef idx="minor">
+            <a:schemeClr val="lt1"/>
+          </a:fontRef>
+        </p:style>
+        <p:txBody>
+          <a:bodyPr rtlCol="1" anchor="ctr"/>
+          <a:lstStyle/>
+          <a:p>
+            <a:pPr algn="ctr"/>
+            <a:r>
+              <a:rPr lang="en-US" dirty="0"/>
+              <a:t>Supervised learning</a:t>
+            </a:r>
+            <a:endParaRPr lang="he-IL" dirty="0"/>
+          </a:p>
+        </p:txBody>
+      </p:sp>
+      <p:sp>
+        <p:nvSpPr>
+          <p:cNvPr id="7" name="Rounded Rectangle 6"/>
+          <p:cNvSpPr/>
+          <p:nvPr/>
+        </p:nvSpPr>
+        <p:spPr>
+          <a:xfrm>
+            <a:off x="441065" y="2000920"/>
+            <a:ext cx="1775012" cy="623943"/>
+          </a:xfrm>
+          <a:prstGeom prst="roundRect">
+            <a:avLst/>
+          </a:prstGeom>
+          <a:ln>
+            <a:headEnd type="none" w="med" len="med"/>
+            <a:tailEnd type="none" w="med" len="med"/>
+          </a:ln>
+        </p:spPr>
+        <p:style>
+          <a:lnRef idx="2">
+            <a:schemeClr val="accent2"/>
+          </a:lnRef>
+          <a:fillRef idx="1">
+            <a:schemeClr val="lt1"/>
+          </a:fillRef>
+          <a:effectRef idx="0">
+            <a:schemeClr val="accent2"/>
+          </a:effectRef>
+          <a:fontRef idx="minor">
+            <a:schemeClr val="dk1"/>
+          </a:fontRef>
+        </p:style>
+        <p:txBody>
+          <a:bodyPr rtlCol="1" anchor="ctr"/>
+          <a:lstStyle/>
+          <a:p>
+            <a:pPr algn="ctr"/>
+            <a:r>
+              <a:rPr lang="en-US" dirty="0"/>
+              <a:t>Unsupervised learning</a:t>
+            </a:r>
+          </a:p>
+        </p:txBody>
+      </p:sp>
+      <p:sp>
+        <p:nvSpPr>
+          <p:cNvPr id="8" name="Rounded Rectangle 7"/>
+          <p:cNvSpPr/>
+          <p:nvPr/>
+        </p:nvSpPr>
+        <p:spPr>
+          <a:xfrm>
+            <a:off x="3528511" y="4129373"/>
+            <a:ext cx="1785765" cy="623943"/>
+          </a:xfrm>
+          <a:prstGeom prst="roundRect">
+            <a:avLst/>
+          </a:prstGeom>
+        </p:spPr>
+        <p:style>
+          <a:lnRef idx="2">
+            <a:schemeClr val="accent2"/>
+          </a:lnRef>
+          <a:fillRef idx="1">
+            <a:schemeClr val="lt1"/>
+          </a:fillRef>
+          <a:effectRef idx="0">
+            <a:schemeClr val="accent2"/>
+          </a:effectRef>
+          <a:fontRef idx="minor">
+            <a:schemeClr val="dk1"/>
+          </a:fontRef>
+        </p:style>
+        <p:txBody>
+          <a:bodyPr rtlCol="1" anchor="ctr"/>
+          <a:lstStyle/>
+          <a:p>
+            <a:pPr algn="ctr"/>
+            <a:r>
+              <a:rPr lang="en-US" dirty="0"/>
+              <a:t>Classification</a:t>
+            </a:r>
+            <a:endParaRPr lang="he-IL" dirty="0"/>
+          </a:p>
+        </p:txBody>
+      </p:sp>
+      <p:sp>
+        <p:nvSpPr>
+          <p:cNvPr id="9" name="Rounded Rectangle 8"/>
+          <p:cNvSpPr/>
+          <p:nvPr/>
+        </p:nvSpPr>
+        <p:spPr>
+          <a:xfrm>
+            <a:off x="9918559" y="3161180"/>
+            <a:ext cx="1592128" cy="623943"/>
+          </a:xfrm>
+          <a:prstGeom prst="roundRect">
+            <a:avLst/>
+          </a:prstGeom>
+        </p:spPr>
+        <p:style>
+          <a:lnRef idx="3">
+            <a:schemeClr val="lt1"/>
+          </a:lnRef>
+          <a:fillRef idx="1">
+            <a:schemeClr val="accent5"/>
+          </a:fillRef>
+          <a:effectRef idx="1">
+            <a:schemeClr val="accent5"/>
+          </a:effectRef>
+          <a:fontRef idx="minor">
+            <a:schemeClr val="lt1"/>
+          </a:fontRef>
+        </p:style>
+        <p:txBody>
+          <a:bodyPr rtlCol="1" anchor="ctr"/>
+          <a:lstStyle/>
+          <a:p>
+            <a:pPr algn="ctr"/>
+            <a:r>
+              <a:rPr lang="en-US" dirty="0"/>
+              <a:t>Feature importance</a:t>
+            </a:r>
+            <a:endParaRPr lang="he-IL" dirty="0"/>
+          </a:p>
+        </p:txBody>
+      </p:sp>
+      <p:sp>
+        <p:nvSpPr>
+          <p:cNvPr id="10" name="Rounded Rectangle 9"/>
+          <p:cNvSpPr/>
+          <p:nvPr/>
+        </p:nvSpPr>
+        <p:spPr>
+          <a:xfrm>
+            <a:off x="7901252" y="5495589"/>
+            <a:ext cx="1592128" cy="623943"/>
+          </a:xfrm>
+          <a:prstGeom prst="roundRect">
+            <a:avLst/>
+          </a:prstGeom>
+        </p:spPr>
+        <p:style>
+          <a:lnRef idx="3">
+            <a:schemeClr val="lt1"/>
+          </a:lnRef>
+          <a:fillRef idx="1">
+            <a:schemeClr val="accent5"/>
+          </a:fillRef>
+          <a:effectRef idx="1">
+            <a:schemeClr val="accent5"/>
+          </a:effectRef>
+          <a:fontRef idx="minor">
+            <a:schemeClr val="lt1"/>
+          </a:fontRef>
+        </p:style>
+        <p:txBody>
+          <a:bodyPr rtlCol="1" anchor="ctr"/>
+          <a:lstStyle/>
+          <a:p>
+            <a:pPr algn="ctr"/>
+            <a:r>
+              <a:rPr lang="en-US" dirty="0"/>
+              <a:t>Shrinkage methods</a:t>
+            </a:r>
+            <a:endParaRPr lang="he-IL" dirty="0"/>
+          </a:p>
+        </p:txBody>
+      </p:sp>
+      <p:sp>
+        <p:nvSpPr>
+          <p:cNvPr id="11" name="Rounded Rectangle 10"/>
+          <p:cNvSpPr/>
+          <p:nvPr/>
+        </p:nvSpPr>
+        <p:spPr>
+          <a:xfrm>
+            <a:off x="9897042" y="5140586"/>
+            <a:ext cx="1108033" cy="623943"/>
+          </a:xfrm>
+          <a:prstGeom prst="roundRect">
+            <a:avLst/>
+          </a:prstGeom>
+        </p:spPr>
+        <p:style>
+          <a:lnRef idx="3">
+            <a:schemeClr val="lt1"/>
+          </a:lnRef>
+          <a:fillRef idx="1">
+            <a:schemeClr val="accent5"/>
+          </a:fillRef>
+          <a:effectRef idx="1">
+            <a:schemeClr val="accent5"/>
+          </a:effectRef>
+          <a:fontRef idx="minor">
+            <a:schemeClr val="lt1"/>
+          </a:fontRef>
+        </p:style>
+        <p:txBody>
+          <a:bodyPr rtlCol="1" anchor="ctr"/>
+          <a:lstStyle/>
+          <a:p>
+            <a:pPr algn="ctr"/>
+            <a:r>
+              <a:rPr lang="en-US" dirty="0"/>
+              <a:t>Ridge</a:t>
+            </a:r>
+            <a:endParaRPr lang="he-IL" dirty="0"/>
+          </a:p>
+        </p:txBody>
+      </p:sp>
+      <p:sp>
+        <p:nvSpPr>
+          <p:cNvPr id="12" name="Rounded Rectangle 11"/>
+          <p:cNvSpPr/>
+          <p:nvPr/>
+        </p:nvSpPr>
+        <p:spPr>
+          <a:xfrm>
+            <a:off x="9897041" y="5891923"/>
+            <a:ext cx="1108033" cy="623943"/>
+          </a:xfrm>
+          <a:prstGeom prst="roundRect">
+            <a:avLst/>
+          </a:prstGeom>
+        </p:spPr>
+        <p:style>
+          <a:lnRef idx="3">
+            <a:schemeClr val="lt1"/>
+          </a:lnRef>
+          <a:fillRef idx="1">
+            <a:schemeClr val="accent5"/>
+          </a:fillRef>
+          <a:effectRef idx="1">
+            <a:schemeClr val="accent5"/>
+          </a:effectRef>
+          <a:fontRef idx="minor">
+            <a:schemeClr val="lt1"/>
+          </a:fontRef>
+        </p:style>
+        <p:txBody>
+          <a:bodyPr rtlCol="1" anchor="ctr"/>
+          <a:lstStyle/>
+          <a:p>
+            <a:pPr algn="ctr"/>
+            <a:r>
+              <a:rPr lang="en-US" dirty="0"/>
+              <a:t>Lasso</a:t>
+            </a:r>
+            <a:endParaRPr lang="he-IL" dirty="0"/>
+          </a:p>
+        </p:txBody>
+      </p:sp>
+      <p:sp>
+        <p:nvSpPr>
+          <p:cNvPr id="13" name="Rounded Rectangle 12"/>
+          <p:cNvSpPr/>
+          <p:nvPr/>
+        </p:nvSpPr>
+        <p:spPr>
+          <a:xfrm>
+            <a:off x="1516830" y="4130942"/>
+            <a:ext cx="1775012" cy="623943"/>
+          </a:xfrm>
+          <a:prstGeom prst="roundRect">
+            <a:avLst/>
+          </a:prstGeom>
+          <a:ln>
+            <a:headEnd type="none" w="med" len="med"/>
+            <a:tailEnd type="none" w="med" len="med"/>
+          </a:ln>
+        </p:spPr>
+        <p:style>
+          <a:lnRef idx="2">
+            <a:schemeClr val="accent2"/>
+          </a:lnRef>
+          <a:fillRef idx="1">
+            <a:schemeClr val="lt1"/>
+          </a:fillRef>
+          <a:effectRef idx="0">
+            <a:schemeClr val="accent2"/>
+          </a:effectRef>
+          <a:fontRef idx="minor">
+            <a:schemeClr val="dk1"/>
+          </a:fontRef>
+        </p:style>
+        <p:txBody>
+          <a:bodyPr rtlCol="1" anchor="ctr"/>
+          <a:lstStyle/>
+          <a:p>
+            <a:pPr algn="ctr"/>
+            <a:r>
+              <a:rPr lang="en-US" dirty="0"/>
+              <a:t>Model evaluation</a:t>
+            </a:r>
+            <a:endParaRPr lang="he-IL" dirty="0"/>
+          </a:p>
+        </p:txBody>
+      </p:sp>
+      <p:sp>
+        <p:nvSpPr>
+          <p:cNvPr id="14" name="Rounded Rectangle 13"/>
+          <p:cNvSpPr/>
+          <p:nvPr/>
+        </p:nvSpPr>
+        <p:spPr>
+          <a:xfrm>
+            <a:off x="591681" y="2913754"/>
+            <a:ext cx="1473794" cy="623943"/>
+          </a:xfrm>
+          <a:prstGeom prst="roundRect">
+            <a:avLst/>
+          </a:prstGeom>
+        </p:spPr>
+        <p:style>
+          <a:lnRef idx="3">
+            <a:schemeClr val="lt1"/>
+          </a:lnRef>
+          <a:fillRef idx="1">
+            <a:schemeClr val="accent5"/>
+          </a:fillRef>
+          <a:effectRef idx="1">
+            <a:schemeClr val="accent5"/>
+          </a:effectRef>
+          <a:fontRef idx="minor">
+            <a:schemeClr val="lt1"/>
+          </a:fontRef>
+        </p:style>
+        <p:txBody>
+          <a:bodyPr rtlCol="1" anchor="ctr"/>
+          <a:lstStyle/>
+          <a:p>
+            <a:pPr algn="ctr"/>
+            <a:r>
+              <a:rPr lang="en-US" dirty="0"/>
+              <a:t>PCA</a:t>
+            </a:r>
+            <a:endParaRPr lang="he-IL" dirty="0"/>
+          </a:p>
+        </p:txBody>
+      </p:sp>
+      <p:sp>
+        <p:nvSpPr>
+          <p:cNvPr id="15" name="Rounded Rectangle 14"/>
+          <p:cNvSpPr/>
+          <p:nvPr/>
+        </p:nvSpPr>
+        <p:spPr>
+          <a:xfrm>
+            <a:off x="5443370" y="4129372"/>
+            <a:ext cx="1785765" cy="623943"/>
+          </a:xfrm>
+          <a:prstGeom prst="roundRect">
+            <a:avLst/>
+          </a:prstGeom>
+        </p:spPr>
+        <p:style>
+          <a:lnRef idx="3">
+            <a:schemeClr val="lt1"/>
+          </a:lnRef>
+          <a:fillRef idx="1">
+            <a:schemeClr val="accent2"/>
+          </a:fillRef>
+          <a:effectRef idx="1">
+            <a:schemeClr val="accent2"/>
+          </a:effectRef>
+          <a:fontRef idx="minor">
+            <a:schemeClr val="lt1"/>
+          </a:fontRef>
+        </p:style>
+        <p:txBody>
+          <a:bodyPr rtlCol="1" anchor="ctr"/>
+          <a:lstStyle/>
+          <a:p>
+            <a:pPr algn="ctr"/>
+            <a:r>
+              <a:rPr lang="en-US" dirty="0"/>
+              <a:t>Regression</a:t>
+            </a:r>
+            <a:endParaRPr lang="he-IL" dirty="0"/>
+          </a:p>
+        </p:txBody>
+      </p:sp>
+      <p:sp>
+        <p:nvSpPr>
+          <p:cNvPr id="16" name="Rounded Rectangle 15"/>
+          <p:cNvSpPr/>
+          <p:nvPr/>
+        </p:nvSpPr>
+        <p:spPr>
+          <a:xfrm>
+            <a:off x="4448049" y="2935269"/>
+            <a:ext cx="1785765" cy="623943"/>
+          </a:xfrm>
+          <a:prstGeom prst="roundRect">
+            <a:avLst/>
+          </a:prstGeom>
+        </p:spPr>
+        <p:style>
+          <a:lnRef idx="3">
+            <a:schemeClr val="lt1"/>
+          </a:lnRef>
+          <a:fillRef idx="1">
+            <a:schemeClr val="accent2"/>
+          </a:fillRef>
+          <a:effectRef idx="1">
+            <a:schemeClr val="accent2"/>
+          </a:effectRef>
+          <a:fontRef idx="minor">
+            <a:schemeClr val="lt1"/>
+          </a:fontRef>
+        </p:style>
+        <p:txBody>
+          <a:bodyPr rtlCol="1" anchor="ctr"/>
+          <a:lstStyle/>
+          <a:p>
+            <a:pPr algn="ctr"/>
+            <a:r>
+              <a:rPr lang="en-US" dirty="0"/>
+              <a:t>Models</a:t>
+            </a:r>
+            <a:endParaRPr lang="he-IL" dirty="0"/>
+          </a:p>
+        </p:txBody>
+      </p:sp>
+      <p:sp>
+        <p:nvSpPr>
+          <p:cNvPr id="17" name="Rounded Rectangle 16"/>
+          <p:cNvSpPr/>
+          <p:nvPr/>
+        </p:nvSpPr>
+        <p:spPr>
+          <a:xfrm>
+            <a:off x="2511673" y="2935269"/>
+            <a:ext cx="1785765" cy="623943"/>
+          </a:xfrm>
+          <a:prstGeom prst="roundRect">
+            <a:avLst/>
+          </a:prstGeom>
+        </p:spPr>
+        <p:style>
+          <a:lnRef idx="2">
+            <a:schemeClr val="accent2"/>
+          </a:lnRef>
+          <a:fillRef idx="1">
+            <a:schemeClr val="lt1"/>
+          </a:fillRef>
+          <a:effectRef idx="0">
+            <a:schemeClr val="accent2"/>
+          </a:effectRef>
+          <a:fontRef idx="minor">
+            <a:schemeClr val="dk1"/>
+          </a:fontRef>
+        </p:style>
+        <p:txBody>
+          <a:bodyPr rtlCol="1" anchor="ctr"/>
+          <a:lstStyle/>
+          <a:p>
+            <a:pPr algn="ctr"/>
+            <a:r>
+              <a:rPr lang="en-US" dirty="0"/>
+              <a:t>Methods</a:t>
+            </a:r>
+            <a:endParaRPr lang="he-IL" dirty="0"/>
+          </a:p>
+        </p:txBody>
+      </p:sp>
+      <p:sp>
+        <p:nvSpPr>
+          <p:cNvPr id="18" name="Rounded Rectangle 17"/>
+          <p:cNvSpPr/>
+          <p:nvPr/>
+        </p:nvSpPr>
+        <p:spPr>
+          <a:xfrm>
+            <a:off x="7901252" y="3548458"/>
+            <a:ext cx="1592128" cy="623943"/>
+          </a:xfrm>
+          <a:prstGeom prst="roundRect">
+            <a:avLst/>
+          </a:prstGeom>
+        </p:spPr>
+        <p:style>
+          <a:lnRef idx="3">
+            <a:schemeClr val="lt1"/>
+          </a:lnRef>
+          <a:fillRef idx="1">
+            <a:schemeClr val="accent5"/>
+          </a:fillRef>
+          <a:effectRef idx="1">
+            <a:schemeClr val="accent5"/>
+          </a:effectRef>
+          <a:fontRef idx="minor">
+            <a:schemeClr val="lt1"/>
+          </a:fontRef>
+        </p:style>
+        <p:txBody>
+          <a:bodyPr rtlCol="1" anchor="ctr"/>
+          <a:lstStyle/>
+          <a:p>
+            <a:pPr algn="ctr"/>
+            <a:r>
+              <a:rPr lang="en-US" dirty="0"/>
+              <a:t>Linear regression</a:t>
+            </a:r>
+            <a:endParaRPr lang="he-IL" dirty="0"/>
+          </a:p>
+        </p:txBody>
+      </p:sp>
+      <p:sp>
+        <p:nvSpPr>
+          <p:cNvPr id="19" name="Rounded Rectangle 18"/>
+          <p:cNvSpPr/>
+          <p:nvPr/>
+        </p:nvSpPr>
+        <p:spPr>
+          <a:xfrm>
+            <a:off x="9918559" y="3924973"/>
+            <a:ext cx="1592128" cy="623943"/>
+          </a:xfrm>
+          <a:prstGeom prst="roundRect">
+            <a:avLst/>
+          </a:prstGeom>
+        </p:spPr>
+        <p:style>
+          <a:lnRef idx="3">
+            <a:schemeClr val="lt1"/>
+          </a:lnRef>
+          <a:fillRef idx="1">
+            <a:schemeClr val="accent5"/>
+          </a:fillRef>
+          <a:effectRef idx="1">
+            <a:schemeClr val="accent5"/>
+          </a:effectRef>
+          <a:fontRef idx="minor">
+            <a:schemeClr val="lt1"/>
+          </a:fontRef>
+        </p:style>
+        <p:txBody>
+          <a:bodyPr rtlCol="1" anchor="ctr"/>
+          <a:lstStyle/>
+          <a:p>
+            <a:pPr algn="ctr"/>
+            <a:r>
+              <a:rPr lang="en-US" dirty="0"/>
+              <a:t>Variable selection</a:t>
+            </a:r>
+            <a:endParaRPr lang="he-IL" dirty="0"/>
+          </a:p>
+        </p:txBody>
+      </p:sp>
+      <p:sp>
+        <p:nvSpPr>
+          <p:cNvPr id="20" name="Rounded Rectangle 19"/>
+          <p:cNvSpPr/>
+          <p:nvPr/>
+        </p:nvSpPr>
+        <p:spPr>
+          <a:xfrm>
+            <a:off x="7901252" y="4624219"/>
+            <a:ext cx="1592128" cy="623943"/>
+          </a:xfrm>
+          <a:prstGeom prst="roundRect">
+            <a:avLst/>
+          </a:prstGeom>
+        </p:spPr>
+        <p:style>
+          <a:lnRef idx="3">
+            <a:schemeClr val="lt1"/>
+          </a:lnRef>
+          <a:fillRef idx="1">
+            <a:schemeClr val="accent5"/>
+          </a:fillRef>
+          <a:effectRef idx="1">
+            <a:schemeClr val="accent5"/>
+          </a:effectRef>
+          <a:fontRef idx="minor">
+            <a:schemeClr val="lt1"/>
+          </a:fontRef>
+        </p:style>
+        <p:txBody>
+          <a:bodyPr rtlCol="1" anchor="ctr"/>
+          <a:lstStyle/>
+          <a:p>
+            <a:pPr algn="ctr"/>
+            <a:r>
+              <a:rPr lang="en-US" dirty="0"/>
+              <a:t>Quantile regression</a:t>
+            </a:r>
+            <a:endParaRPr lang="he-IL" dirty="0"/>
+          </a:p>
+        </p:txBody>
+      </p:sp>
+      <p:cxnSp>
+        <p:nvCxnSpPr>
+          <p:cNvPr id="21" name="Straight Arrow Connector 20"/>
+          <p:cNvCxnSpPr>
+            <a:stCxn id="6" idx="2"/>
+            <a:endCxn id="16" idx="0"/>
+          </p:cNvCxnSpPr>
+          <p:nvPr/>
+        </p:nvCxnSpPr>
+        <p:spPr>
+          <a:xfrm>
+            <a:off x="4265409" y="2624863"/>
+            <a:ext cx="1075523" cy="310406"/>
+          </a:xfrm>
+          <a:prstGeom prst="straightConnector1">
+            <a:avLst/>
+          </a:prstGeom>
+          <a:ln>
+            <a:tailEnd type="triangle"/>
+          </a:ln>
+        </p:spPr>
+        <p:style>
+          <a:lnRef idx="2">
+            <a:schemeClr val="dk1"/>
+          </a:lnRef>
+          <a:fillRef idx="0">
+            <a:schemeClr val="dk1"/>
+          </a:fillRef>
+          <a:effectRef idx="1">
+            <a:schemeClr val="dk1"/>
+          </a:effectRef>
+          <a:fontRef idx="minor">
+            <a:schemeClr val="tx1"/>
+          </a:fontRef>
+        </p:style>
+      </p:cxnSp>
+      <p:cxnSp>
+        <p:nvCxnSpPr>
+          <p:cNvPr id="22" name="Straight Arrow Connector 21"/>
+          <p:cNvCxnSpPr>
+            <a:stCxn id="16" idx="2"/>
+            <a:endCxn id="15" idx="0"/>
+          </p:cNvCxnSpPr>
+          <p:nvPr/>
+        </p:nvCxnSpPr>
+        <p:spPr>
+          <a:xfrm>
+            <a:off x="5340932" y="3559212"/>
+            <a:ext cx="995321" cy="570160"/>
+          </a:xfrm>
+          <a:prstGeom prst="straightConnector1">
+            <a:avLst/>
+          </a:prstGeom>
+          <a:ln>
+            <a:tailEnd type="triangle"/>
+          </a:ln>
+        </p:spPr>
+        <p:style>
+          <a:lnRef idx="2">
+            <a:schemeClr val="dk1"/>
+          </a:lnRef>
+          <a:fillRef idx="0">
+            <a:schemeClr val="dk1"/>
+          </a:fillRef>
+          <a:effectRef idx="1">
+            <a:schemeClr val="dk1"/>
+          </a:effectRef>
+          <a:fontRef idx="minor">
+            <a:schemeClr val="tx1"/>
+          </a:fontRef>
+        </p:style>
+      </p:cxnSp>
+      <p:cxnSp>
+        <p:nvCxnSpPr>
+          <p:cNvPr id="23" name="Straight Arrow Connector 22"/>
+          <p:cNvCxnSpPr>
+            <a:stCxn id="18" idx="2"/>
+            <a:endCxn id="20" idx="0"/>
+          </p:cNvCxnSpPr>
+          <p:nvPr/>
+        </p:nvCxnSpPr>
+        <p:spPr>
+          <a:xfrm>
+            <a:off x="8697316" y="4172401"/>
+            <a:ext cx="0" cy="451818"/>
+          </a:xfrm>
+          <a:prstGeom prst="straightConnector1">
+            <a:avLst/>
+          </a:prstGeom>
+          <a:ln>
+            <a:tailEnd type="triangle"/>
+          </a:ln>
+        </p:spPr>
+        <p:style>
+          <a:lnRef idx="2">
+            <a:schemeClr val="dk1"/>
+          </a:lnRef>
+          <a:fillRef idx="0">
+            <a:schemeClr val="dk1"/>
+          </a:fillRef>
+          <a:effectRef idx="1">
+            <a:schemeClr val="dk1"/>
+          </a:effectRef>
+          <a:fontRef idx="minor">
+            <a:schemeClr val="tx1"/>
+          </a:fontRef>
+        </p:style>
+      </p:cxnSp>
+      <p:cxnSp>
+        <p:nvCxnSpPr>
+          <p:cNvPr id="24" name="Straight Arrow Connector 23"/>
+          <p:cNvCxnSpPr>
+            <a:stCxn id="15" idx="3"/>
+            <a:endCxn id="18" idx="1"/>
+          </p:cNvCxnSpPr>
+          <p:nvPr/>
+        </p:nvCxnSpPr>
+        <p:spPr>
+          <a:xfrm flipV="1">
+            <a:off x="7229135" y="3860430"/>
+            <a:ext cx="672117" cy="580914"/>
+          </a:xfrm>
+          <a:prstGeom prst="straightConnector1">
+            <a:avLst/>
+          </a:prstGeom>
+          <a:ln>
+            <a:tailEnd type="triangle"/>
+          </a:ln>
+        </p:spPr>
+        <p:style>
+          <a:lnRef idx="2">
+            <a:schemeClr val="dk1"/>
+          </a:lnRef>
+          <a:fillRef idx="0">
+            <a:schemeClr val="dk1"/>
+          </a:fillRef>
+          <a:effectRef idx="1">
+            <a:schemeClr val="dk1"/>
+          </a:effectRef>
+          <a:fontRef idx="minor">
+            <a:schemeClr val="tx1"/>
+          </a:fontRef>
+        </p:style>
+      </p:cxnSp>
+      <p:cxnSp>
+        <p:nvCxnSpPr>
+          <p:cNvPr id="25" name="Straight Arrow Connector 24"/>
+          <p:cNvCxnSpPr>
+            <a:stCxn id="10" idx="3"/>
+            <a:endCxn id="11" idx="1"/>
+          </p:cNvCxnSpPr>
+          <p:nvPr/>
+        </p:nvCxnSpPr>
+        <p:spPr>
+          <a:xfrm flipV="1">
+            <a:off x="9493380" y="5452558"/>
+            <a:ext cx="403662" cy="355003"/>
+          </a:xfrm>
+          <a:prstGeom prst="straightConnector1">
+            <a:avLst/>
+          </a:prstGeom>
+          <a:ln>
+            <a:tailEnd type="triangle"/>
+          </a:ln>
+        </p:spPr>
+        <p:style>
+          <a:lnRef idx="2">
+            <a:schemeClr val="dk1"/>
+          </a:lnRef>
+          <a:fillRef idx="0">
+            <a:schemeClr val="dk1"/>
+          </a:fillRef>
+          <a:effectRef idx="1">
+            <a:schemeClr val="dk1"/>
+          </a:effectRef>
+          <a:fontRef idx="minor">
+            <a:schemeClr val="tx1"/>
+          </a:fontRef>
+        </p:style>
+      </p:cxnSp>
+      <p:cxnSp>
+        <p:nvCxnSpPr>
+          <p:cNvPr id="26" name="Straight Arrow Connector 25"/>
+          <p:cNvCxnSpPr>
+            <a:stCxn id="10" idx="3"/>
+            <a:endCxn id="12" idx="1"/>
+          </p:cNvCxnSpPr>
+          <p:nvPr/>
+        </p:nvCxnSpPr>
+        <p:spPr>
+          <a:xfrm>
+            <a:off x="9493380" y="5807561"/>
+            <a:ext cx="403661" cy="396334"/>
+          </a:xfrm>
+          <a:prstGeom prst="straightConnector1">
+            <a:avLst/>
+          </a:prstGeom>
+          <a:ln>
+            <a:tailEnd type="triangle"/>
+          </a:ln>
+        </p:spPr>
+        <p:style>
+          <a:lnRef idx="2">
+            <a:schemeClr val="dk1"/>
+          </a:lnRef>
+          <a:fillRef idx="0">
+            <a:schemeClr val="dk1"/>
+          </a:fillRef>
+          <a:effectRef idx="1">
+            <a:schemeClr val="dk1"/>
+          </a:effectRef>
+          <a:fontRef idx="minor">
+            <a:schemeClr val="tx1"/>
+          </a:fontRef>
+        </p:style>
+      </p:cxnSp>
+      <p:cxnSp>
+        <p:nvCxnSpPr>
+          <p:cNvPr id="27" name="Straight Arrow Connector 26"/>
+          <p:cNvCxnSpPr>
+            <a:stCxn id="18" idx="3"/>
+            <a:endCxn id="9" idx="1"/>
+          </p:cNvCxnSpPr>
+          <p:nvPr/>
+        </p:nvCxnSpPr>
+        <p:spPr>
+          <a:xfrm flipV="1">
+            <a:off x="9493380" y="3473152"/>
+            <a:ext cx="425179" cy="387278"/>
+          </a:xfrm>
+          <a:prstGeom prst="straightConnector1">
+            <a:avLst/>
+          </a:prstGeom>
+          <a:ln>
+            <a:tailEnd type="triangle"/>
+          </a:ln>
+        </p:spPr>
+        <p:style>
+          <a:lnRef idx="2">
+            <a:schemeClr val="dk1"/>
+          </a:lnRef>
+          <a:fillRef idx="0">
+            <a:schemeClr val="dk1"/>
+          </a:fillRef>
+          <a:effectRef idx="1">
+            <a:schemeClr val="dk1"/>
+          </a:effectRef>
+          <a:fontRef idx="minor">
+            <a:schemeClr val="tx1"/>
+          </a:fontRef>
+        </p:style>
+      </p:cxnSp>
+      <p:cxnSp>
+        <p:nvCxnSpPr>
+          <p:cNvPr id="28" name="Straight Arrow Connector 27"/>
+          <p:cNvCxnSpPr>
+            <a:stCxn id="18" idx="3"/>
+            <a:endCxn id="19" idx="1"/>
+          </p:cNvCxnSpPr>
+          <p:nvPr/>
+        </p:nvCxnSpPr>
+        <p:spPr>
+          <a:xfrm>
+            <a:off x="9493380" y="3860430"/>
+            <a:ext cx="425179" cy="376515"/>
+          </a:xfrm>
+          <a:prstGeom prst="straightConnector1">
+            <a:avLst/>
+          </a:prstGeom>
+          <a:ln>
+            <a:tailEnd type="triangle"/>
+          </a:ln>
+        </p:spPr>
+        <p:style>
+          <a:lnRef idx="2">
+            <a:schemeClr val="dk1"/>
+          </a:lnRef>
+          <a:fillRef idx="0">
+            <a:schemeClr val="dk1"/>
+          </a:fillRef>
+          <a:effectRef idx="1">
+            <a:schemeClr val="dk1"/>
+          </a:effectRef>
+          <a:fontRef idx="minor">
+            <a:schemeClr val="tx1"/>
+          </a:fontRef>
+        </p:style>
+      </p:cxnSp>
+      <p:cxnSp>
+        <p:nvCxnSpPr>
+          <p:cNvPr id="29" name="Straight Arrow Connector 28"/>
+          <p:cNvCxnSpPr>
+            <a:stCxn id="6" idx="2"/>
+            <a:endCxn id="17" idx="0"/>
+          </p:cNvCxnSpPr>
+          <p:nvPr/>
+        </p:nvCxnSpPr>
+        <p:spPr>
+          <a:xfrm flipH="1">
+            <a:off x="3404556" y="2624863"/>
+            <a:ext cx="860853" cy="310406"/>
+          </a:xfrm>
+          <a:prstGeom prst="straightConnector1">
+            <a:avLst/>
+          </a:prstGeom>
+          <a:ln>
+            <a:tailEnd type="triangle"/>
+          </a:ln>
+        </p:spPr>
+        <p:style>
+          <a:lnRef idx="2">
+            <a:schemeClr val="dk1"/>
+          </a:lnRef>
+          <a:fillRef idx="0">
+            <a:schemeClr val="dk1"/>
+          </a:fillRef>
+          <a:effectRef idx="1">
+            <a:schemeClr val="dk1"/>
+          </a:effectRef>
+          <a:fontRef idx="minor">
+            <a:schemeClr val="tx1"/>
+          </a:fontRef>
+        </p:style>
+      </p:cxnSp>
+      <p:cxnSp>
+        <p:nvCxnSpPr>
+          <p:cNvPr id="30" name="Straight Arrow Connector 29"/>
+          <p:cNvCxnSpPr>
+            <a:stCxn id="7" idx="2"/>
+            <a:endCxn id="14" idx="0"/>
+          </p:cNvCxnSpPr>
+          <p:nvPr/>
+        </p:nvCxnSpPr>
+        <p:spPr>
+          <a:xfrm>
+            <a:off x="1328571" y="2624863"/>
+            <a:ext cx="7" cy="288891"/>
+          </a:xfrm>
+          <a:prstGeom prst="straightConnector1">
+            <a:avLst/>
+          </a:prstGeom>
+          <a:ln>
+            <a:tailEnd type="triangle"/>
+          </a:ln>
+        </p:spPr>
+        <p:style>
+          <a:lnRef idx="2">
+            <a:schemeClr val="dk1"/>
+          </a:lnRef>
+          <a:fillRef idx="0">
+            <a:schemeClr val="dk1"/>
+          </a:fillRef>
+          <a:effectRef idx="1">
+            <a:schemeClr val="dk1"/>
+          </a:effectRef>
+          <a:fontRef idx="minor">
+            <a:schemeClr val="tx1"/>
+          </a:fontRef>
+        </p:style>
+      </p:cxnSp>
+      <p:cxnSp>
+        <p:nvCxnSpPr>
+          <p:cNvPr id="31" name="Straight Arrow Connector 30"/>
+          <p:cNvCxnSpPr>
+            <a:stCxn id="16" idx="2"/>
+            <a:endCxn id="8" idx="0"/>
+          </p:cNvCxnSpPr>
+          <p:nvPr/>
+        </p:nvCxnSpPr>
+        <p:spPr>
+          <a:xfrm flipH="1">
+            <a:off x="4421394" y="3559212"/>
+            <a:ext cx="919538" cy="570161"/>
+          </a:xfrm>
+          <a:prstGeom prst="straightConnector1">
+            <a:avLst/>
+          </a:prstGeom>
+          <a:ln>
+            <a:tailEnd type="triangle"/>
+          </a:ln>
+        </p:spPr>
+        <p:style>
+          <a:lnRef idx="2">
+            <a:schemeClr val="dk1"/>
+          </a:lnRef>
+          <a:fillRef idx="0">
+            <a:schemeClr val="dk1"/>
+          </a:fillRef>
+          <a:effectRef idx="1">
+            <a:schemeClr val="dk1"/>
+          </a:effectRef>
+          <a:fontRef idx="minor">
+            <a:schemeClr val="tx1"/>
+          </a:fontRef>
+        </p:style>
+      </p:cxnSp>
+      <p:cxnSp>
+        <p:nvCxnSpPr>
+          <p:cNvPr id="32" name="Straight Arrow Connector 31"/>
+          <p:cNvCxnSpPr>
+            <a:stCxn id="17" idx="2"/>
+            <a:endCxn id="13" idx="0"/>
+          </p:cNvCxnSpPr>
+          <p:nvPr/>
+        </p:nvCxnSpPr>
+        <p:spPr>
+          <a:xfrm flipH="1">
+            <a:off x="2404336" y="3559212"/>
+            <a:ext cx="1000220" cy="571730"/>
+          </a:xfrm>
+          <a:prstGeom prst="straightConnector1">
+            <a:avLst/>
+          </a:prstGeom>
+          <a:ln>
+            <a:tailEnd type="triangle"/>
+          </a:ln>
+        </p:spPr>
+        <p:style>
+          <a:lnRef idx="2">
+            <a:schemeClr val="dk1"/>
+          </a:lnRef>
+          <a:fillRef idx="0">
+            <a:schemeClr val="dk1"/>
+          </a:fillRef>
+          <a:effectRef idx="1">
+            <a:schemeClr val="dk1"/>
+          </a:effectRef>
+          <a:fontRef idx="minor">
+            <a:schemeClr val="tx1"/>
+          </a:fontRef>
+        </p:style>
+      </p:cxnSp>
+      <p:cxnSp>
+        <p:nvCxnSpPr>
+          <p:cNvPr id="33" name="Elbow Connector 32"/>
+          <p:cNvCxnSpPr>
+            <a:stCxn id="18" idx="2"/>
+            <a:endCxn id="10" idx="1"/>
+          </p:cNvCxnSpPr>
+          <p:nvPr/>
+        </p:nvCxnSpPr>
+        <p:spPr>
+          <a:xfrm rot="5400000">
+            <a:off x="7481704" y="4591949"/>
+            <a:ext cx="1635160" cy="796064"/>
+          </a:xfrm>
+          <a:prstGeom prst="bentConnector4">
+            <a:avLst>
+              <a:gd name="adj1" fmla="val 14145"/>
+              <a:gd name="adj2" fmla="val 128716"/>
+            </a:avLst>
+          </a:prstGeom>
+          <a:ln>
+            <a:tailEnd type="triangle"/>
+          </a:ln>
+        </p:spPr>
+        <p:style>
+          <a:lnRef idx="2">
+            <a:schemeClr val="dk1"/>
+          </a:lnRef>
+          <a:fillRef idx="0">
+            <a:schemeClr val="dk1"/>
+          </a:fillRef>
+          <a:effectRef idx="1">
+            <a:schemeClr val="dk1"/>
+          </a:effectRef>
+          <a:fontRef idx="minor">
+            <a:schemeClr val="tx1"/>
+          </a:fontRef>
+        </p:style>
+      </p:cxnSp>
+      <p:sp>
+        <p:nvSpPr>
+          <p:cNvPr id="34" name="Rounded Rectangle 33"/>
+          <p:cNvSpPr/>
+          <p:nvPr/>
+        </p:nvSpPr>
+        <p:spPr>
+          <a:xfrm>
+            <a:off x="4464425" y="5174438"/>
+            <a:ext cx="2753954" cy="763792"/>
+          </a:xfrm>
+          <a:prstGeom prst="roundRect">
+            <a:avLst/>
+          </a:prstGeom>
+        </p:spPr>
+        <p:style>
+          <a:lnRef idx="2">
+            <a:schemeClr val="accent2"/>
+          </a:lnRef>
+          <a:fillRef idx="1">
+            <a:schemeClr val="lt1"/>
+          </a:fillRef>
+          <a:effectRef idx="0">
+            <a:schemeClr val="accent2"/>
+          </a:effectRef>
+          <a:fontRef idx="minor">
+            <a:schemeClr val="dk1"/>
+          </a:fontRef>
+        </p:style>
+        <p:txBody>
+          <a:bodyPr rtlCol="1" anchor="ctr"/>
+          <a:lstStyle/>
+          <a:p>
+            <a:pPr algn="ctr"/>
+            <a:r>
+              <a:rPr lang="en-US" dirty="0"/>
+              <a:t>Additional algorithms (e.g. </a:t>
+            </a:r>
+            <a:r>
+              <a:rPr lang="en-US" dirty="0" err="1"/>
+              <a:t>knn</a:t>
+            </a:r>
+            <a:r>
+              <a:rPr lang="en-US" dirty="0"/>
+              <a:t>, trees,…)</a:t>
+            </a:r>
+            <a:endParaRPr lang="he-IL" dirty="0"/>
+          </a:p>
+        </p:txBody>
+      </p:sp>
+      <p:cxnSp>
+        <p:nvCxnSpPr>
+          <p:cNvPr id="35" name="Straight Arrow Connector 34"/>
+          <p:cNvCxnSpPr>
+            <a:stCxn id="15" idx="2"/>
+            <a:endCxn id="34" idx="0"/>
+          </p:cNvCxnSpPr>
+          <p:nvPr/>
+        </p:nvCxnSpPr>
+        <p:spPr>
+          <a:xfrm flipH="1">
+            <a:off x="5841402" y="4753315"/>
+            <a:ext cx="494851" cy="421123"/>
+          </a:xfrm>
+          <a:prstGeom prst="straightConnector1">
+            <a:avLst/>
+          </a:prstGeom>
+          <a:ln>
+            <a:tailEnd type="triangle"/>
+          </a:ln>
+        </p:spPr>
+        <p:style>
+          <a:lnRef idx="2">
+            <a:schemeClr val="dk1"/>
+          </a:lnRef>
+          <a:fillRef idx="0">
+            <a:schemeClr val="dk1"/>
+          </a:fillRef>
+          <a:effectRef idx="1">
+            <a:schemeClr val="dk1"/>
+          </a:effectRef>
+          <a:fontRef idx="minor">
+            <a:schemeClr val="tx1"/>
+          </a:fontRef>
+        </p:style>
+      </p:cxnSp>
+    </p:spTree>
+    <p:extLst>
+      <p:ext uri="{BB962C8B-B14F-4D97-AF65-F5344CB8AC3E}">
+        <p14:creationId xmlns:p14="http://schemas.microsoft.com/office/powerpoint/2010/main" val="1139907710"/>
+      </p:ext>
+    </p:extLst>
+  </p:cSld>
+  <p:clrMapOvr>
+    <a:masterClrMapping/>
+  </p:clrMapOvr>
+</p:sld>
+</file>
+
+<file path=ppt/slides/slide25.xml><?xml version="1.0" encoding="utf-8"?>
+<p:sld xmlns:a="http://schemas.openxmlformats.org/drawingml/2006/main" xmlns:r="http://schemas.openxmlformats.org/officeDocument/2006/relationships" xmlns:p="http://schemas.openxmlformats.org/presentationml/2006/main">
+  <p:cSld>
+    <p:spTree>
+      <p:nvGrpSpPr>
+        <p:cNvPr id="1" name=""/>
+        <p:cNvGrpSpPr/>
+        <p:nvPr/>
+      </p:nvGrpSpPr>
+      <p:grpSpPr>
+        <a:xfrm>
+          <a:off x="0" y="0"/>
+          <a:ext cx="0" cy="0"/>
+          <a:chOff x="0" y="0"/>
+          <a:chExt cx="0" cy="0"/>
+        </a:xfrm>
+      </p:grpSpPr>
+      <p:sp>
+        <p:nvSpPr>
+          <p:cNvPr id="2" name="Title 1">
+            <a:extLst>
+              <a:ext uri="{FF2B5EF4-FFF2-40B4-BE49-F238E27FC236}">
+                <a16:creationId xmlns:a16="http://schemas.microsoft.com/office/drawing/2014/main" id="{67F725B3-635B-4D2D-9057-88B295F29442}"/>
+              </a:ext>
+            </a:extLst>
+          </p:cNvPr>
+          <p:cNvSpPr>
+            <a:spLocks noGrp="1"/>
+          </p:cNvSpPr>
+          <p:nvPr>
+            <p:ph type="title"/>
+          </p:nvPr>
+        </p:nvSpPr>
+        <p:spPr/>
+        <p:txBody>
+          <a:bodyPr/>
+          <a:lstStyle/>
+          <a:p>
+            <a:r>
+              <a:rPr lang="en-US" dirty="0"/>
+              <a:t>Summary</a:t>
+            </a:r>
+            <a:endParaRPr lang="en-IL" dirty="0"/>
+          </a:p>
+        </p:txBody>
+      </p:sp>
+      <p:sp>
+        <p:nvSpPr>
+          <p:cNvPr id="3" name="Content Placeholder 2">
+            <a:extLst>
+              <a:ext uri="{FF2B5EF4-FFF2-40B4-BE49-F238E27FC236}">
+                <a16:creationId xmlns:a16="http://schemas.microsoft.com/office/drawing/2014/main" id="{F7B4D936-3CBB-4BF2-813A-EF6EF947E629}"/>
+              </a:ext>
+            </a:extLst>
+          </p:cNvPr>
+          <p:cNvSpPr>
+            <a:spLocks noGrp="1"/>
+          </p:cNvSpPr>
+          <p:nvPr>
+            <p:ph idx="1"/>
+          </p:nvPr>
+        </p:nvSpPr>
+        <p:spPr/>
+        <p:txBody>
+          <a:bodyPr/>
+          <a:lstStyle/>
+          <a:p>
+            <a:r>
+              <a:rPr lang="en-US" dirty="0"/>
+              <a:t>Though a very “simplistic tool”, linear regression can be a very good tool for gaining insights, and help the exploratory process</a:t>
+            </a:r>
+          </a:p>
+          <a:p>
+            <a:r>
+              <a:rPr lang="en-US" dirty="0"/>
+              <a:t>It is quick to run, and can illustrate relationships of variables</a:t>
+            </a:r>
+          </a:p>
+          <a:p>
+            <a:r>
+              <a:rPr lang="en-US" dirty="0"/>
+              <a:t>It has some nice extensions, which can be beneficial in various situations</a:t>
+            </a:r>
+          </a:p>
+          <a:p>
+            <a:r>
+              <a:rPr lang="en-US" dirty="0"/>
+              <a:t>Even though it is not as flexible as other regression tools (i.e., forests, boosting, NNs), it can provide a reference – “starting point”, from which one can improve further with other models</a:t>
+            </a:r>
+          </a:p>
+        </p:txBody>
+      </p:sp>
+      <p:sp>
+        <p:nvSpPr>
+          <p:cNvPr id="4" name="Footer Placeholder 3">
+            <a:extLst>
+              <a:ext uri="{FF2B5EF4-FFF2-40B4-BE49-F238E27FC236}">
+                <a16:creationId xmlns:a16="http://schemas.microsoft.com/office/drawing/2014/main" id="{0D6ACDF8-EA81-4839-8A10-6D624B18D70B}"/>
+              </a:ext>
+            </a:extLst>
+          </p:cNvPr>
+          <p:cNvSpPr>
+            <a:spLocks noGrp="1"/>
+          </p:cNvSpPr>
+          <p:nvPr>
+            <p:ph type="ftr" sz="quarter" idx="11"/>
+          </p:nvPr>
+        </p:nvSpPr>
+        <p:spPr/>
+        <p:txBody>
+          <a:bodyPr/>
+          <a:lstStyle/>
+          <a:p>
+            <a:r>
+              <a:rPr lang="en-US"/>
+              <a:t>Materials by Adi Sarid https://adisarid.github.io and http://www.sarid-ins.com</a:t>
+            </a:r>
+            <a:endParaRPr lang="en-US" dirty="0"/>
+          </a:p>
+        </p:txBody>
+      </p:sp>
+      <p:sp>
+        <p:nvSpPr>
+          <p:cNvPr id="5" name="Slide Number Placeholder 4">
+            <a:extLst>
+              <a:ext uri="{FF2B5EF4-FFF2-40B4-BE49-F238E27FC236}">
+                <a16:creationId xmlns:a16="http://schemas.microsoft.com/office/drawing/2014/main" id="{F81CD851-1B68-4BC6-ABC7-6FE5369A415A}"/>
+              </a:ext>
+            </a:extLst>
+          </p:cNvPr>
+          <p:cNvSpPr>
+            <a:spLocks noGrp="1"/>
+          </p:cNvSpPr>
+          <p:nvPr>
+            <p:ph type="sldNum" sz="quarter" idx="12"/>
+          </p:nvPr>
+        </p:nvSpPr>
+        <p:spPr/>
+        <p:txBody>
+          <a:bodyPr/>
+          <a:lstStyle/>
+          <a:p>
+            <a:fld id="{4FAB73BC-B049-4115-A692-8D63A059BFB8}" type="slidenum">
+              <a:rPr lang="en-US" smtClean="0"/>
+              <a:t>25</a:t>
+            </a:fld>
+            <a:endParaRPr lang="en-US" dirty="0"/>
+          </a:p>
+        </p:txBody>
+      </p:sp>
+    </p:spTree>
+    <p:extLst>
+      <p:ext uri="{BB962C8B-B14F-4D97-AF65-F5344CB8AC3E}">
+        <p14:creationId xmlns:p14="http://schemas.microsoft.com/office/powerpoint/2010/main" val="1162116287"/>
       </p:ext>
     </p:extLst>
   </p:cSld>

</xml_diff>

<commit_message>
Added ridge and lasso examples
</commit_message>
<xml_diff>
--- a/presentation/pptx/01-Linear_regression_methods.pptx
+++ b/presentation/pptx/01-Linear_regression_methods.pptx
@@ -5,7 +5,7 @@
     <p:sldMasterId id="2147483840" r:id="rId1"/>
   </p:sldMasterIdLst>
   <p:notesMasterIdLst>
-    <p:notesMasterId r:id="rId28"/>
+    <p:notesMasterId r:id="rId29"/>
   </p:notesMasterIdLst>
   <p:sldIdLst>
     <p:sldId id="256" r:id="rId2"/>
@@ -32,8 +32,9 @@
     <p:sldId id="281" r:id="rId23"/>
     <p:sldId id="261" r:id="rId24"/>
     <p:sldId id="285" r:id="rId25"/>
-    <p:sldId id="284" r:id="rId26"/>
-    <p:sldId id="283" r:id="rId27"/>
+    <p:sldId id="286" r:id="rId26"/>
+    <p:sldId id="284" r:id="rId27"/>
+    <p:sldId id="283" r:id="rId28"/>
   </p:sldIdLst>
   <p:sldSz cx="12192000" cy="6858000"/>
   <p:notesSz cx="6858000" cy="9144000"/>
@@ -13807,13 +13808,13 @@
               <a:lstStyle/>
               <a:p>
                 <a:r>
-                  <a:rPr lang="en-US" sz="2400" dirty="0" smtClean="0"/>
+                  <a:rPr lang="en-US" dirty="0" smtClean="0"/>
                   <a:t>Ridge regression:</a:t>
                 </a:r>
               </a:p>
               <a:p>
                 <a:r>
-                  <a:rPr lang="en-US" sz="2400" dirty="0" smtClean="0"/>
+                  <a:rPr lang="en-US" dirty="0" smtClean="0"/>
                   <a:t>Minimize:</a:t>
                 </a:r>
               </a:p>
@@ -13821,7 +13822,7 @@
                 <a14:m>
                   <m:oMath xmlns:m="http://schemas.openxmlformats.org/officeDocument/2006/math">
                     <m:r>
-                      <a:rPr lang="en-US" sz="2400" i="1">
+                      <a:rPr lang="en-US" i="1">
                         <a:latin typeface="Cambria Math" panose="02040503050406030204" pitchFamily="18" charset="0"/>
                       </a:rPr>
                       <m:t>∑</m:t>
@@ -13829,7 +13830,7 @@
                     <m:sSup>
                       <m:sSupPr>
                         <m:ctrlPr>
-                          <a:rPr lang="en-US" sz="2400" i="1">
+                          <a:rPr lang="en-US" i="1">
                             <a:latin typeface="Cambria Math" panose="02040503050406030204" pitchFamily="18" charset="0"/>
                           </a:rPr>
                         </m:ctrlPr>
@@ -13838,7 +13839,7 @@
                         <m:d>
                           <m:dPr>
                             <m:ctrlPr>
-                              <a:rPr lang="en-US" sz="2400" i="1">
+                              <a:rPr lang="en-US" i="1">
                                 <a:latin typeface="Cambria Math" panose="02040503050406030204" pitchFamily="18" charset="0"/>
                               </a:rPr>
                             </m:ctrlPr>
@@ -13847,14 +13848,14 @@
                             <m:sSub>
                               <m:sSubPr>
                                 <m:ctrlPr>
-                                  <a:rPr lang="en-US" sz="2400" i="1">
+                                  <a:rPr lang="en-US" i="1">
                                     <a:latin typeface="Cambria Math" panose="02040503050406030204" pitchFamily="18" charset="0"/>
                                   </a:rPr>
                                 </m:ctrlPr>
                               </m:sSubPr>
                               <m:e>
                                 <m:r>
-                                  <a:rPr lang="en-US" sz="2400" i="1">
+                                  <a:rPr lang="en-US" i="1">
                                     <a:latin typeface="Cambria Math" panose="02040503050406030204" pitchFamily="18" charset="0"/>
                                   </a:rPr>
                                   <m:t>𝑦</m:t>
@@ -13862,7 +13863,7 @@
                               </m:e>
                               <m:sub>
                                 <m:r>
-                                  <a:rPr lang="en-US" sz="2400" i="1">
+                                  <a:rPr lang="en-US" i="1">
                                     <a:latin typeface="Cambria Math" panose="02040503050406030204" pitchFamily="18" charset="0"/>
                                   </a:rPr>
                                   <m:t>𝑖</m:t>
@@ -13870,7 +13871,7 @@
                               </m:sub>
                             </m:sSub>
                             <m:r>
-                              <a:rPr lang="en-US" sz="2400" i="1">
+                              <a:rPr lang="en-US" i="1">
                                 <a:latin typeface="Cambria Math" panose="02040503050406030204" pitchFamily="18" charset="0"/>
                               </a:rPr>
                               <m:t>−</m:t>
@@ -13879,14 +13880,14 @@
                               <m:accPr>
                                 <m:chr m:val="̂"/>
                                 <m:ctrlPr>
-                                  <a:rPr lang="en-US" sz="2400" i="1">
+                                  <a:rPr lang="en-US" i="1">
                                     <a:latin typeface="Cambria Math" panose="02040503050406030204" pitchFamily="18" charset="0"/>
                                   </a:rPr>
                                 </m:ctrlPr>
                               </m:accPr>
                               <m:e>
                                 <m:r>
-                                  <a:rPr lang="en-US" sz="2400" i="1">
+                                  <a:rPr lang="en-US" i="1">
                                     <a:latin typeface="Cambria Math" panose="02040503050406030204" pitchFamily="18" charset="0"/>
                                   </a:rPr>
                                   <m:t>𝑦</m:t>
@@ -13898,7 +13899,7 @@
                       </m:e>
                       <m:sup>
                         <m:r>
-                          <a:rPr lang="en-US" sz="2400" i="1">
+                          <a:rPr lang="en-US" i="1">
                             <a:latin typeface="Cambria Math" panose="02040503050406030204" pitchFamily="18" charset="0"/>
                           </a:rPr>
                           <m:t>2</m:t>
@@ -13906,13 +13907,13 @@
                       </m:sup>
                     </m:sSup>
                     <m:r>
-                      <a:rPr lang="en-US" sz="2400" b="0" i="0" smtClean="0">
+                      <a:rPr lang="en-US" b="0" i="0" smtClean="0">
                         <a:latin typeface="Cambria Math" panose="02040503050406030204" pitchFamily="18" charset="0"/>
                       </a:rPr>
                       <m:t>+</m:t>
                     </m:r>
                     <m:r>
-                      <a:rPr lang="en-US" sz="2400" b="0" i="1" smtClean="0">
+                      <a:rPr lang="en-US" b="0" i="1" smtClean="0">
                         <a:latin typeface="Cambria Math" panose="02040503050406030204" pitchFamily="18" charset="0"/>
                       </a:rPr>
                       <m:t>𝜆</m:t>
@@ -13920,7 +13921,7 @@
                     <m:d>
                       <m:dPr>
                         <m:ctrlPr>
-                          <a:rPr lang="en-US" sz="2400" b="0" i="1" smtClean="0">
+                          <a:rPr lang="en-US" b="0" i="1" smtClean="0">
                             <a:latin typeface="Cambria Math" panose="02040503050406030204" pitchFamily="18" charset="0"/>
                           </a:rPr>
                         </m:ctrlPr>
@@ -13929,14 +13930,14 @@
                         <m:sSubSup>
                           <m:sSubSupPr>
                             <m:ctrlPr>
-                              <a:rPr lang="en-US" sz="2400" b="0" i="1" smtClean="0">
+                              <a:rPr lang="en-US" b="0" i="1" smtClean="0">
                                 <a:latin typeface="Cambria Math" panose="02040503050406030204" pitchFamily="18" charset="0"/>
                               </a:rPr>
                             </m:ctrlPr>
                           </m:sSubSupPr>
                           <m:e>
                             <m:r>
-                              <a:rPr lang="en-US" sz="2400" b="0" i="1" smtClean="0">
+                              <a:rPr lang="en-US" b="0" i="1" smtClean="0">
                                 <a:latin typeface="Cambria Math" panose="02040503050406030204" pitchFamily="18" charset="0"/>
                               </a:rPr>
                               <m:t>𝛽</m:t>
@@ -13944,7 +13945,7 @@
                           </m:e>
                           <m:sub>
                             <m:r>
-                              <a:rPr lang="en-US" sz="2400" b="0" i="1" smtClean="0">
+                              <a:rPr lang="en-US" b="0" i="1" smtClean="0">
                                 <a:latin typeface="Cambria Math" panose="02040503050406030204" pitchFamily="18" charset="0"/>
                               </a:rPr>
                               <m:t>1</m:t>
@@ -13952,7 +13953,7 @@
                           </m:sub>
                           <m:sup>
                             <m:r>
-                              <a:rPr lang="en-US" sz="2400" b="0" i="1" smtClean="0">
+                              <a:rPr lang="en-US" b="0" i="1" smtClean="0">
                                 <a:latin typeface="Cambria Math" panose="02040503050406030204" pitchFamily="18" charset="0"/>
                               </a:rPr>
                               <m:t>2</m:t>
@@ -13960,7 +13961,7 @@
                           </m:sup>
                         </m:sSubSup>
                         <m:r>
-                          <a:rPr lang="en-US" sz="2400" b="0" i="1" smtClean="0">
+                          <a:rPr lang="en-US" b="0" i="1" smtClean="0">
                             <a:latin typeface="Cambria Math" panose="02040503050406030204" pitchFamily="18" charset="0"/>
                           </a:rPr>
                           <m:t>+</m:t>
@@ -13968,14 +13969,14 @@
                         <m:sSubSup>
                           <m:sSubSupPr>
                             <m:ctrlPr>
-                              <a:rPr lang="en-US" sz="2400" b="0" i="1" smtClean="0">
+                              <a:rPr lang="en-US" b="0" i="1" smtClean="0">
                                 <a:latin typeface="Cambria Math" panose="02040503050406030204" pitchFamily="18" charset="0"/>
                               </a:rPr>
                             </m:ctrlPr>
                           </m:sSubSupPr>
                           <m:e>
                             <m:r>
-                              <a:rPr lang="en-US" sz="2400" b="0" i="1" smtClean="0">
+                              <a:rPr lang="en-US" b="0" i="1" smtClean="0">
                                 <a:latin typeface="Cambria Math" panose="02040503050406030204" pitchFamily="18" charset="0"/>
                               </a:rPr>
                               <m:t>𝛽</m:t>
@@ -13983,7 +13984,7 @@
                           </m:e>
                           <m:sub>
                             <m:r>
-                              <a:rPr lang="en-US" sz="2400" b="0" i="1" smtClean="0">
+                              <a:rPr lang="en-US" b="0" i="1" smtClean="0">
                                 <a:latin typeface="Cambria Math" panose="02040503050406030204" pitchFamily="18" charset="0"/>
                               </a:rPr>
                               <m:t>2</m:t>
@@ -13991,7 +13992,7 @@
                           </m:sub>
                           <m:sup>
                             <m:r>
-                              <a:rPr lang="en-US" sz="2400" b="0" i="1" smtClean="0">
+                              <a:rPr lang="en-US" b="0" i="1" smtClean="0">
                                 <a:latin typeface="Cambria Math" panose="02040503050406030204" pitchFamily="18" charset="0"/>
                               </a:rPr>
                               <m:t>2</m:t>
@@ -13999,7 +14000,7 @@
                           </m:sup>
                         </m:sSubSup>
                         <m:r>
-                          <a:rPr lang="en-US" sz="2400" b="0" i="1" smtClean="0">
+                          <a:rPr lang="en-US" b="0" i="1" smtClean="0">
                             <a:latin typeface="Cambria Math" panose="02040503050406030204" pitchFamily="18" charset="0"/>
                           </a:rPr>
                           <m:t>+…</m:t>
@@ -14008,23 +14009,33 @@
                     </m:d>
                   </m:oMath>
                 </a14:m>
-                <a:endParaRPr lang="en-US" sz="2400" b="0" dirty="0" smtClean="0"/>
+                <a:endParaRPr lang="en-US" b="0" dirty="0" smtClean="0"/>
               </a:p>
               <a:p>
-                <a:endParaRPr lang="en-US" sz="2400" dirty="0" smtClean="0"/>
+                <a:endParaRPr lang="en-US" dirty="0" smtClean="0"/>
               </a:p>
               <a:p>
                 <a:r>
-                  <a:rPr lang="en-US" sz="2400" dirty="0" smtClean="0"/>
+                  <a:rPr lang="en-US" dirty="0" smtClean="0"/>
                   <a:t>RSS with an </a:t>
                 </a:r>
                 <a:r>
-                  <a:rPr lang="en-US" sz="2400" b="1" dirty="0" smtClean="0"/>
+                  <a:rPr lang="en-US" b="1" dirty="0" smtClean="0"/>
                   <a:t>L2 penalty </a:t>
                 </a:r>
                 <a:r>
-                  <a:rPr lang="en-US" sz="2400" dirty="0" smtClean="0"/>
+                  <a:rPr lang="en-US" dirty="0" smtClean="0"/>
                   <a:t>on coefficients</a:t>
+                </a:r>
+              </a:p>
+              <a:p>
+                <a:r>
+                  <a:rPr lang="en-US" b="1" dirty="0" smtClean="0"/>
+                  <a:t>Retains all coefficients</a:t>
+                </a:r>
+                <a:r>
+                  <a:rPr lang="en-US" dirty="0" smtClean="0"/>
+                  <a:t>, but makes them smaller</a:t>
                 </a:r>
               </a:p>
             </p:txBody>
@@ -14049,7 +14060,7 @@
               <a:blipFill>
                 <a:blip r:embed="rId2"/>
                 <a:stretch>
-                  <a:fillRect l="-1154" t="-2505"/>
+                  <a:fillRect l="-641" t="-2119"/>
                 </a:stretch>
               </a:blipFill>
             </p:spPr>
@@ -14093,13 +14104,13 @@
               <a:lstStyle/>
               <a:p>
                 <a:r>
-                  <a:rPr lang="en-US" sz="2400" dirty="0" smtClean="0"/>
+                  <a:rPr lang="en-US" dirty="0" smtClean="0"/>
                   <a:t>Lasso regression:</a:t>
                 </a:r>
               </a:p>
               <a:p>
                 <a:r>
-                  <a:rPr lang="en-US" sz="2400" dirty="0" smtClean="0"/>
+                  <a:rPr lang="en-US" dirty="0" smtClean="0"/>
                   <a:t>Minimize:</a:t>
                 </a:r>
               </a:p>
@@ -14107,7 +14118,7 @@
                 <a14:m>
                   <m:oMath xmlns:m="http://schemas.openxmlformats.org/officeDocument/2006/math">
                     <m:r>
-                      <a:rPr lang="en-US" sz="2400" i="1">
+                      <a:rPr lang="en-US" i="1">
                         <a:latin typeface="Cambria Math" panose="02040503050406030204" pitchFamily="18" charset="0"/>
                       </a:rPr>
                       <m:t>∑</m:t>
@@ -14115,7 +14126,7 @@
                     <m:sSup>
                       <m:sSupPr>
                         <m:ctrlPr>
-                          <a:rPr lang="en-US" sz="2400" i="1">
+                          <a:rPr lang="en-US" i="1">
                             <a:latin typeface="Cambria Math" panose="02040503050406030204" pitchFamily="18" charset="0"/>
                           </a:rPr>
                         </m:ctrlPr>
@@ -14124,7 +14135,7 @@
                         <m:d>
                           <m:dPr>
                             <m:ctrlPr>
-                              <a:rPr lang="en-US" sz="2400" i="1">
+                              <a:rPr lang="en-US" i="1">
                                 <a:latin typeface="Cambria Math" panose="02040503050406030204" pitchFamily="18" charset="0"/>
                               </a:rPr>
                             </m:ctrlPr>
@@ -14133,14 +14144,14 @@
                             <m:sSub>
                               <m:sSubPr>
                                 <m:ctrlPr>
-                                  <a:rPr lang="en-US" sz="2400" i="1">
+                                  <a:rPr lang="en-US" i="1">
                                     <a:latin typeface="Cambria Math" panose="02040503050406030204" pitchFamily="18" charset="0"/>
                                   </a:rPr>
                                 </m:ctrlPr>
                               </m:sSubPr>
                               <m:e>
                                 <m:r>
-                                  <a:rPr lang="en-US" sz="2400" i="1">
+                                  <a:rPr lang="en-US" i="1">
                                     <a:latin typeface="Cambria Math" panose="02040503050406030204" pitchFamily="18" charset="0"/>
                                   </a:rPr>
                                   <m:t>𝑦</m:t>
@@ -14148,7 +14159,7 @@
                               </m:e>
                               <m:sub>
                                 <m:r>
-                                  <a:rPr lang="en-US" sz="2400" i="1">
+                                  <a:rPr lang="en-US" i="1">
                                     <a:latin typeface="Cambria Math" panose="02040503050406030204" pitchFamily="18" charset="0"/>
                                   </a:rPr>
                                   <m:t>𝑖</m:t>
@@ -14156,7 +14167,7 @@
                               </m:sub>
                             </m:sSub>
                             <m:r>
-                              <a:rPr lang="en-US" sz="2400" i="1">
+                              <a:rPr lang="en-US" i="1">
                                 <a:latin typeface="Cambria Math" panose="02040503050406030204" pitchFamily="18" charset="0"/>
                               </a:rPr>
                               <m:t>−</m:t>
@@ -14165,14 +14176,14 @@
                               <m:accPr>
                                 <m:chr m:val="̂"/>
                                 <m:ctrlPr>
-                                  <a:rPr lang="en-US" sz="2400" i="1">
+                                  <a:rPr lang="en-US" i="1">
                                     <a:latin typeface="Cambria Math" panose="02040503050406030204" pitchFamily="18" charset="0"/>
                                   </a:rPr>
                                 </m:ctrlPr>
                               </m:accPr>
                               <m:e>
                                 <m:r>
-                                  <a:rPr lang="en-US" sz="2400" i="1">
+                                  <a:rPr lang="en-US" i="1">
                                     <a:latin typeface="Cambria Math" panose="02040503050406030204" pitchFamily="18" charset="0"/>
                                   </a:rPr>
                                   <m:t>𝑦</m:t>
@@ -14184,7 +14195,7 @@
                       </m:e>
                       <m:sup>
                         <m:r>
-                          <a:rPr lang="en-US" sz="2400" i="1">
+                          <a:rPr lang="en-US" i="1">
                             <a:latin typeface="Cambria Math" panose="02040503050406030204" pitchFamily="18" charset="0"/>
                           </a:rPr>
                           <m:t>2</m:t>
@@ -14192,13 +14203,13 @@
                       </m:sup>
                     </m:sSup>
                     <m:r>
-                      <a:rPr lang="en-US" sz="2400">
+                      <a:rPr lang="en-US">
                         <a:latin typeface="Cambria Math" panose="02040503050406030204" pitchFamily="18" charset="0"/>
                       </a:rPr>
                       <m:t>+</m:t>
                     </m:r>
                     <m:r>
-                      <a:rPr lang="en-US" sz="2400" i="1">
+                      <a:rPr lang="en-US" i="1">
                         <a:latin typeface="Cambria Math" panose="02040503050406030204" pitchFamily="18" charset="0"/>
                       </a:rPr>
                       <m:t>𝜆</m:t>
@@ -14206,14 +14217,14 @@
                     <m:d>
                       <m:dPr>
                         <m:ctrlPr>
-                          <a:rPr lang="en-US" sz="2400" i="1">
+                          <a:rPr lang="en-US" i="1">
                             <a:latin typeface="Cambria Math" panose="02040503050406030204" pitchFamily="18" charset="0"/>
                           </a:rPr>
                         </m:ctrlPr>
                       </m:dPr>
                       <m:e>
                         <m:r>
-                          <a:rPr lang="en-US" sz="2400" b="0" i="1" smtClean="0">
+                          <a:rPr lang="en-US" b="0" i="1" smtClean="0">
                             <a:latin typeface="Cambria Math" panose="02040503050406030204" pitchFamily="18" charset="0"/>
                           </a:rPr>
                           <m:t>|</m:t>
@@ -14221,14 +14232,14 @@
                         <m:sSub>
                           <m:sSubPr>
                             <m:ctrlPr>
-                              <a:rPr lang="en-US" sz="2400" b="0" i="1" smtClean="0">
+                              <a:rPr lang="en-US" b="0" i="1" smtClean="0">
                                 <a:latin typeface="Cambria Math" panose="02040503050406030204" pitchFamily="18" charset="0"/>
                               </a:rPr>
                             </m:ctrlPr>
                           </m:sSubPr>
                           <m:e>
                             <m:r>
-                              <a:rPr lang="en-US" sz="2400" b="0" i="1" smtClean="0">
+                              <a:rPr lang="en-US" b="0" i="1" smtClean="0">
                                 <a:latin typeface="Cambria Math" panose="02040503050406030204" pitchFamily="18" charset="0"/>
                               </a:rPr>
                               <m:t>𝛽</m:t>
@@ -14236,7 +14247,7 @@
                           </m:e>
                           <m:sub>
                             <m:r>
-                              <a:rPr lang="en-US" sz="2400" b="0" i="1" smtClean="0">
+                              <a:rPr lang="en-US" b="0" i="1" smtClean="0">
                                 <a:latin typeface="Cambria Math" panose="02040503050406030204" pitchFamily="18" charset="0"/>
                               </a:rPr>
                               <m:t>1</m:t>
@@ -14244,19 +14255,19 @@
                           </m:sub>
                         </m:sSub>
                         <m:r>
-                          <a:rPr lang="en-US" sz="2400" b="0" i="1" smtClean="0">
+                          <a:rPr lang="en-US" b="0" i="1" smtClean="0">
                             <a:latin typeface="Cambria Math" panose="02040503050406030204" pitchFamily="18" charset="0"/>
                           </a:rPr>
                           <m:t>|</m:t>
                         </m:r>
                         <m:r>
-                          <a:rPr lang="en-US" sz="2400" i="1">
+                          <a:rPr lang="en-US" i="1">
                             <a:latin typeface="Cambria Math" panose="02040503050406030204" pitchFamily="18" charset="0"/>
                           </a:rPr>
                           <m:t>+</m:t>
                         </m:r>
                         <m:r>
-                          <a:rPr lang="en-US" sz="2400" b="0" i="1" smtClean="0">
+                          <a:rPr lang="en-US" b="0" i="1" smtClean="0">
                             <a:latin typeface="Cambria Math" panose="02040503050406030204" pitchFamily="18" charset="0"/>
                           </a:rPr>
                           <m:t>|</m:t>
@@ -14264,14 +14275,14 @@
                         <m:sSub>
                           <m:sSubPr>
                             <m:ctrlPr>
-                              <a:rPr lang="en-US" sz="2400" b="0" i="1" smtClean="0">
+                              <a:rPr lang="en-US" b="0" i="1" smtClean="0">
                                 <a:latin typeface="Cambria Math" panose="02040503050406030204" pitchFamily="18" charset="0"/>
                               </a:rPr>
                             </m:ctrlPr>
                           </m:sSubPr>
                           <m:e>
                             <m:r>
-                              <a:rPr lang="en-US" sz="2400" b="0" i="1" smtClean="0">
+                              <a:rPr lang="en-US" b="0" i="1" smtClean="0">
                                 <a:latin typeface="Cambria Math" panose="02040503050406030204" pitchFamily="18" charset="0"/>
                               </a:rPr>
                               <m:t>𝛽</m:t>
@@ -14279,7 +14290,7 @@
                           </m:e>
                           <m:sub>
                             <m:r>
-                              <a:rPr lang="en-US" sz="2400" b="0" i="1" smtClean="0">
+                              <a:rPr lang="en-US" b="0" i="1" smtClean="0">
                                 <a:latin typeface="Cambria Math" panose="02040503050406030204" pitchFamily="18" charset="0"/>
                               </a:rPr>
                               <m:t>2</m:t>
@@ -14287,13 +14298,13 @@
                           </m:sub>
                         </m:sSub>
                         <m:r>
-                          <a:rPr lang="en-US" sz="2400" b="0" i="1" smtClean="0">
+                          <a:rPr lang="en-US" b="0" i="1" smtClean="0">
                             <a:latin typeface="Cambria Math" panose="02040503050406030204" pitchFamily="18" charset="0"/>
                           </a:rPr>
                           <m:t>|</m:t>
                         </m:r>
                         <m:r>
-                          <a:rPr lang="en-US" sz="2400" i="1">
+                          <a:rPr lang="en-US" i="1">
                             <a:latin typeface="Cambria Math" panose="02040503050406030204" pitchFamily="18" charset="0"/>
                           </a:rPr>
                           <m:t>+…</m:t>
@@ -14302,25 +14313,39 @@
                     </m:d>
                   </m:oMath>
                 </a14:m>
-                <a:endParaRPr lang="en-US" sz="2400" dirty="0" smtClean="0"/>
+                <a:endParaRPr lang="en-US" dirty="0" smtClean="0"/>
               </a:p>
               <a:p>
-                <a:endParaRPr lang="en-US" sz="2400" dirty="0"/>
+                <a:endParaRPr lang="en-US" dirty="0"/>
               </a:p>
               <a:p>
                 <a:r>
-                  <a:rPr lang="en-US" sz="2400" dirty="0" smtClean="0"/>
+                  <a:rPr lang="en-US" dirty="0" smtClean="0"/>
                   <a:t>RSS with an </a:t>
                 </a:r>
                 <a:r>
-                  <a:rPr lang="en-US" sz="2400" b="1" dirty="0" smtClean="0"/>
+                  <a:rPr lang="en-US" b="1" dirty="0" smtClean="0"/>
                   <a:t>L1 penalty </a:t>
                 </a:r>
                 <a:r>
-                  <a:rPr lang="en-US" sz="2400" dirty="0" smtClean="0"/>
+                  <a:rPr lang="en-US" dirty="0" smtClean="0"/>
                   <a:t>on coefficients</a:t>
                 </a:r>
-                <a:endParaRPr lang="he-IL" sz="2400" dirty="0"/>
+              </a:p>
+              <a:p>
+                <a:r>
+                  <a:rPr lang="en-US" dirty="0" smtClean="0"/>
+                  <a:t>Tends to </a:t>
+                </a:r>
+                <a:r>
+                  <a:rPr lang="en-US" b="1" dirty="0" smtClean="0"/>
+                  <a:t>eliminate coefficients </a:t>
+                </a:r>
+                <a:r>
+                  <a:rPr lang="en-US" dirty="0" smtClean="0"/>
+                  <a:t>(like feature selection)</a:t>
+                </a:r>
+                <a:endParaRPr lang="he-IL" dirty="0"/>
               </a:p>
             </p:txBody>
           </p:sp>
@@ -14344,7 +14369,7 @@
               <a:blipFill>
                 <a:blip r:embed="rId3"/>
                 <a:stretch>
-                  <a:fillRect l="-1154" t="-2505"/>
+                  <a:fillRect l="-513" t="-2119"/>
                 </a:stretch>
               </a:blipFill>
             </p:spPr>
@@ -14644,6 +14669,128 @@
           <a:lstStyle/>
           <a:p>
             <a:r>
+              <a:rPr lang="en-US" dirty="0" smtClean="0"/>
+              <a:t>Ridge and Lasso demonstration</a:t>
+            </a:r>
+            <a:endParaRPr lang="he-IL" dirty="0"/>
+          </a:p>
+        </p:txBody>
+      </p:sp>
+      <p:sp>
+        <p:nvSpPr>
+          <p:cNvPr id="7" name="Content Placeholder 6"/>
+          <p:cNvSpPr>
+            <a:spLocks noGrp="1"/>
+          </p:cNvSpPr>
+          <p:nvPr>
+            <p:ph idx="1"/>
+          </p:nvPr>
+        </p:nvSpPr>
+        <p:spPr/>
+        <p:txBody>
+          <a:bodyPr/>
+          <a:lstStyle/>
+          <a:p>
+            <a:r>
+              <a:rPr lang="en-US" dirty="0" smtClean="0"/>
+              <a:t>/class code/01-ridge_lasso_glmnet.Rmd</a:t>
+            </a:r>
+            <a:endParaRPr lang="he-IL" dirty="0"/>
+          </a:p>
+        </p:txBody>
+      </p:sp>
+      <p:sp>
+        <p:nvSpPr>
+          <p:cNvPr id="5" name="Footer Placeholder 4"/>
+          <p:cNvSpPr>
+            <a:spLocks noGrp="1"/>
+          </p:cNvSpPr>
+          <p:nvPr>
+            <p:ph type="ftr" sz="quarter" idx="11"/>
+          </p:nvPr>
+        </p:nvSpPr>
+        <p:spPr/>
+        <p:txBody>
+          <a:bodyPr/>
+          <a:lstStyle/>
+          <a:p>
+            <a:r>
+              <a:rPr lang="en-US" smtClean="0"/>
+              <a:t>Materials by Adi Sarid https://adisarid.github.io and http://www.sarid-ins.com</a:t>
+            </a:r>
+            <a:endParaRPr lang="en-US" dirty="0"/>
+          </a:p>
+        </p:txBody>
+      </p:sp>
+      <p:sp>
+        <p:nvSpPr>
+          <p:cNvPr id="6" name="Slide Number Placeholder 5"/>
+          <p:cNvSpPr>
+            <a:spLocks noGrp="1"/>
+          </p:cNvSpPr>
+          <p:nvPr>
+            <p:ph type="sldNum" sz="quarter" idx="12"/>
+          </p:nvPr>
+        </p:nvSpPr>
+        <p:spPr/>
+        <p:txBody>
+          <a:bodyPr/>
+          <a:lstStyle/>
+          <a:p>
+            <a:fld id="{4FAB73BC-B049-4115-A692-8D63A059BFB8}" type="slidenum">
+              <a:rPr lang="en-US" smtClean="0"/>
+              <a:t>25</a:t>
+            </a:fld>
+            <a:endParaRPr lang="en-US" dirty="0"/>
+          </a:p>
+        </p:txBody>
+      </p:sp>
+    </p:spTree>
+    <p:extLst>
+      <p:ext uri="{BB962C8B-B14F-4D97-AF65-F5344CB8AC3E}">
+        <p14:creationId xmlns:p14="http://schemas.microsoft.com/office/powerpoint/2010/main" val="1225703325"/>
+      </p:ext>
+    </p:extLst>
+  </p:cSld>
+  <p:clrMapOvr>
+    <a:masterClrMapping/>
+  </p:clrMapOvr>
+</p:sld>
+</file>
+
+<file path=ppt/slides/slide26.xml><?xml version="1.0" encoding="utf-8"?>
+<p:sld xmlns:a="http://schemas.openxmlformats.org/drawingml/2006/main" xmlns:r="http://schemas.openxmlformats.org/officeDocument/2006/relationships" xmlns:p="http://schemas.openxmlformats.org/presentationml/2006/main">
+  <p:cSld>
+    <p:spTree>
+      <p:nvGrpSpPr>
+        <p:cNvPr id="1" name=""/>
+        <p:cNvGrpSpPr/>
+        <p:nvPr/>
+      </p:nvGrpSpPr>
+      <p:grpSpPr>
+        <a:xfrm>
+          <a:off x="0" y="0"/>
+          <a:ext cx="0" cy="0"/>
+          <a:chOff x="0" y="0"/>
+          <a:chExt cx="0" cy="0"/>
+        </a:xfrm>
+      </p:grpSpPr>
+      <p:sp>
+        <p:nvSpPr>
+          <p:cNvPr id="2" name="Title 1"/>
+          <p:cNvSpPr>
+            <a:spLocks noGrp="1"/>
+          </p:cNvSpPr>
+          <p:nvPr>
+            <p:ph type="title"/>
+          </p:nvPr>
+        </p:nvSpPr>
+        <p:spPr/>
+        <p:txBody>
+          <a:bodyPr/>
+          <a:lstStyle/>
+          <a:p>
+            <a:r>
               <a:rPr lang="en-US" dirty="0"/>
               <a:t>Contents</a:t>
             </a:r>
@@ -14691,7 +14838,7 @@
           <a:p>
             <a:fld id="{4FAB73BC-B049-4115-A692-8D63A059BFB8}" type="slidenum">
               <a:rPr lang="en-US" smtClean="0"/>
-              <a:t>25</a:t>
+              <a:t>26</a:t>
             </a:fld>
             <a:endParaRPr lang="en-US" dirty="0"/>
           </a:p>
@@ -15904,7 +16051,7 @@
 </p:sld>
 </file>
 
-<file path=ppt/slides/slide26.xml><?xml version="1.0" encoding="utf-8"?>
+<file path=ppt/slides/slide27.xml><?xml version="1.0" encoding="utf-8"?>
 <p:sld xmlns:a="http://schemas.openxmlformats.org/drawingml/2006/main" xmlns:r="http://schemas.openxmlformats.org/officeDocument/2006/relationships" xmlns:p="http://schemas.openxmlformats.org/presentationml/2006/main">
   <p:cSld>
     <p:spTree>
@@ -15991,7 +16138,19 @@
           <a:p>
             <a:r>
               <a:rPr lang="en-US" dirty="0"/>
-              <a:t>Even though it is not as flexible as other regression tools (i.e., forests, boosting, NNs), it can provide a reference – “starting point”, from which one can improve further with other models</a:t>
+              <a:t>Even though it is not as flexible as other regression tools (i.e., forests, boosting, </a:t>
+            </a:r>
+            <a:r>
+              <a:rPr lang="en-US" dirty="0" smtClean="0"/>
+              <a:t>neural networks), </a:t>
+            </a:r>
+            <a:r>
+              <a:rPr lang="en-US" dirty="0"/>
+              <a:t>it can provide a reference – “starting point”, from which one can improve further with other </a:t>
+            </a:r>
+            <a:r>
+              <a:rPr lang="en-US" dirty="0" smtClean="0"/>
+              <a:t>models</a:t>
             </a:r>
           </a:p>
         </p:txBody>
@@ -16048,7 +16207,7 @@
           <a:p>
             <a:fld id="{4FAB73BC-B049-4115-A692-8D63A059BFB8}" type="slidenum">
               <a:rPr lang="en-US" smtClean="0"/>
-              <a:t>26</a:t>
+              <a:t>27</a:t>
             </a:fld>
             <a:endParaRPr lang="en-US" dirty="0"/>
           </a:p>

</xml_diff>